<commit_message>
Presentation in good shape, adding pdf file.
</commit_message>
<xml_diff>
--- a/Presentation/GeneticVariantClassificationPres.pptx
+++ b/Presentation/GeneticVariantClassificationPres.pptx
@@ -3949,6 +3949,9 @@
   <p:clrMapOvr>
     <a:masterClrMapping/>
   </p:clrMapOvr>
+  <p:transition spd="slow">
+    <p:push/>
+  </p:transition>
 </p:sld>
 </file>
 
@@ -4152,245 +4155,86 @@
       </p:pic>
       <p:sp>
         <p:nvSpPr>
-          <p:cNvPr id="10" name="Content Placeholder 2">
-            <a:extLst>
-              <a:ext uri="{FF2B5EF4-FFF2-40B4-BE49-F238E27FC236}">
-                <a16:creationId xmlns:a16="http://schemas.microsoft.com/office/drawing/2014/main" id="{B6E2A1B1-381F-9643-A32C-1D87F1A9DFA8}"/>
-              </a:ext>
-            </a:extLst>
-          </p:cNvPr>
-          <p:cNvSpPr txBox="1">
-            <a:spLocks/>
-          </p:cNvSpPr>
+          <p:cNvPr id="11" name="Rounded Rectangle 10">
+            <a:extLst>
+              <a:ext uri="{FF2B5EF4-FFF2-40B4-BE49-F238E27FC236}">
+                <a16:creationId xmlns:a16="http://schemas.microsoft.com/office/drawing/2014/main" id="{3F1C9F13-6B02-6445-BD18-C92385F191FF}"/>
+              </a:ext>
+            </a:extLst>
+          </p:cNvPr>
+          <p:cNvSpPr/>
           <p:nvPr/>
         </p:nvSpPr>
         <p:spPr>
           <a:xfrm>
-            <a:off x="838200" y="1825625"/>
-            <a:ext cx="10515600" cy="4351338"/>
-          </a:xfrm>
-          <a:prstGeom prst="rect">
+            <a:off x="666125" y="1725191"/>
+            <a:ext cx="10724189" cy="4635680"/>
+          </a:xfrm>
+          <a:prstGeom prst="roundRect">
             <a:avLst/>
           </a:prstGeom>
-        </p:spPr>
-        <p:txBody>
-          <a:bodyPr vert="horz" lIns="91440" tIns="45720" rIns="91440" bIns="45720" rtlCol="0">
-            <a:normAutofit fontScale="85000" lnSpcReduction="20000"/>
-          </a:bodyPr>
-          <a:lstStyle>
-            <a:lvl1pPr marL="228600" indent="-228600" algn="l" defTabSz="914400" rtl="0" eaLnBrk="1" latinLnBrk="0" hangingPunct="1">
-              <a:lnSpc>
-                <a:spcPct val="90000"/>
-              </a:lnSpc>
-              <a:spcBef>
-                <a:spcPts val="1000"/>
-              </a:spcBef>
-              <a:buFont typeface="Arial" panose="020B0604020202020204" pitchFamily="34" charset="0"/>
-              <a:buChar char="•"/>
-              <a:defRPr sz="2800" kern="1200">
+          <a:noFill/>
+          <a:ln w="76200">
+            <a:solidFill>
+              <a:srgbClr val="EC435D"/>
+            </a:solidFill>
+          </a:ln>
+        </p:spPr>
+        <p:style>
+          <a:lnRef idx="2">
+            <a:schemeClr val="accent1">
+              <a:shade val="50000"/>
+            </a:schemeClr>
+          </a:lnRef>
+          <a:fillRef idx="1">
+            <a:schemeClr val="accent1"/>
+          </a:fillRef>
+          <a:effectRef idx="0">
+            <a:schemeClr val="accent1"/>
+          </a:effectRef>
+          <a:fontRef idx="minor">
+            <a:schemeClr val="lt1"/>
+          </a:fontRef>
+        </p:style>
+        <p:txBody>
+          <a:bodyPr rtlCol="0" anchor="ctr"/>
+          <a:lstStyle/>
+          <a:p>
+            <a:pPr algn="ctr"/>
+            <a:r>
+              <a:rPr lang="en-US" sz="3200" i="1" dirty="0">
                 <a:solidFill>
                   <a:schemeClr val="tx1"/>
                 </a:solidFill>
-                <a:latin typeface="+mn-lt"/>
-                <a:ea typeface="+mn-ea"/>
-                <a:cs typeface="+mn-cs"/>
-              </a:defRPr>
-            </a:lvl1pPr>
-            <a:lvl2pPr marL="685800" indent="-228600" algn="l" defTabSz="914400" rtl="0" eaLnBrk="1" latinLnBrk="0" hangingPunct="1">
-              <a:lnSpc>
-                <a:spcPct val="90000"/>
-              </a:lnSpc>
-              <a:spcBef>
-                <a:spcPts val="500"/>
-              </a:spcBef>
-              <a:buFont typeface="Arial" panose="020B0604020202020204" pitchFamily="34" charset="0"/>
-              <a:buChar char="•"/>
-              <a:defRPr sz="2400" kern="1200">
+                <a:latin typeface="+mj-lt"/>
+              </a:rPr>
+              <a:t>“The human genome is only on the order of a gigabyte of data, which is a tiny little database. If you take the entire living biosphere…about one petabyte…that’s still very small compared with Google or the Wikipedia. And somehow mother nature manages to create…this incredibly rich environment with this amazingly small amount of data.”</a:t>
+            </a:r>
+          </a:p>
+          <a:p>
+            <a:pPr algn="ctr"/>
+            <a:endParaRPr lang="en-US" sz="3200" i="1" dirty="0">
+              <a:solidFill>
+                <a:schemeClr val="tx1"/>
+              </a:solidFill>
+              <a:latin typeface="+mj-lt"/>
+            </a:endParaRPr>
+          </a:p>
+          <a:p>
+            <a:pPr algn="ctr"/>
+            <a:r>
+              <a:rPr lang="en-US" sz="3200" i="1" dirty="0">
                 <a:solidFill>
                   <a:schemeClr val="tx1"/>
                 </a:solidFill>
-                <a:latin typeface="+mn-lt"/>
-                <a:ea typeface="+mn-ea"/>
-                <a:cs typeface="+mn-cs"/>
-              </a:defRPr>
-            </a:lvl2pPr>
-            <a:lvl3pPr marL="1143000" indent="-228600" algn="l" defTabSz="914400" rtl="0" eaLnBrk="1" latinLnBrk="0" hangingPunct="1">
-              <a:lnSpc>
-                <a:spcPct val="90000"/>
-              </a:lnSpc>
-              <a:spcBef>
-                <a:spcPts val="500"/>
-              </a:spcBef>
-              <a:buFont typeface="Arial" panose="020B0604020202020204" pitchFamily="34" charset="0"/>
-              <a:buChar char="•"/>
-              <a:defRPr sz="2000" kern="1200">
-                <a:solidFill>
-                  <a:schemeClr val="tx1"/>
-                </a:solidFill>
-                <a:latin typeface="+mn-lt"/>
-                <a:ea typeface="+mn-ea"/>
-                <a:cs typeface="+mn-cs"/>
-              </a:defRPr>
-            </a:lvl3pPr>
-            <a:lvl4pPr marL="1600200" indent="-228600" algn="l" defTabSz="914400" rtl="0" eaLnBrk="1" latinLnBrk="0" hangingPunct="1">
-              <a:lnSpc>
-                <a:spcPct val="90000"/>
-              </a:lnSpc>
-              <a:spcBef>
-                <a:spcPts val="500"/>
-              </a:spcBef>
-              <a:buFont typeface="Arial" panose="020B0604020202020204" pitchFamily="34" charset="0"/>
-              <a:buChar char="•"/>
-              <a:defRPr sz="1800" kern="1200">
-                <a:solidFill>
-                  <a:schemeClr val="tx1"/>
-                </a:solidFill>
-                <a:latin typeface="+mn-lt"/>
-                <a:ea typeface="+mn-ea"/>
-                <a:cs typeface="+mn-cs"/>
-              </a:defRPr>
-            </a:lvl4pPr>
-            <a:lvl5pPr marL="2057400" indent="-228600" algn="l" defTabSz="914400" rtl="0" eaLnBrk="1" latinLnBrk="0" hangingPunct="1">
-              <a:lnSpc>
-                <a:spcPct val="90000"/>
-              </a:lnSpc>
-              <a:spcBef>
-                <a:spcPts val="500"/>
-              </a:spcBef>
-              <a:buFont typeface="Arial" panose="020B0604020202020204" pitchFamily="34" charset="0"/>
-              <a:buChar char="•"/>
-              <a:defRPr sz="1800" kern="1200">
-                <a:solidFill>
-                  <a:schemeClr val="tx1"/>
-                </a:solidFill>
-                <a:latin typeface="+mn-lt"/>
-                <a:ea typeface="+mn-ea"/>
-                <a:cs typeface="+mn-cs"/>
-              </a:defRPr>
-            </a:lvl5pPr>
-            <a:lvl6pPr marL="2514600" indent="-228600" algn="l" defTabSz="914400" rtl="0" eaLnBrk="1" latinLnBrk="0" hangingPunct="1">
-              <a:lnSpc>
-                <a:spcPct val="90000"/>
-              </a:lnSpc>
-              <a:spcBef>
-                <a:spcPts val="500"/>
-              </a:spcBef>
-              <a:buFont typeface="Arial" panose="020B0604020202020204" pitchFamily="34" charset="0"/>
-              <a:buChar char="•"/>
-              <a:defRPr sz="1800" kern="1200">
-                <a:solidFill>
-                  <a:schemeClr val="tx1"/>
-                </a:solidFill>
-                <a:latin typeface="+mn-lt"/>
-                <a:ea typeface="+mn-ea"/>
-                <a:cs typeface="+mn-cs"/>
-              </a:defRPr>
-            </a:lvl6pPr>
-            <a:lvl7pPr marL="2971800" indent="-228600" algn="l" defTabSz="914400" rtl="0" eaLnBrk="1" latinLnBrk="0" hangingPunct="1">
-              <a:lnSpc>
-                <a:spcPct val="90000"/>
-              </a:lnSpc>
-              <a:spcBef>
-                <a:spcPts val="500"/>
-              </a:spcBef>
-              <a:buFont typeface="Arial" panose="020B0604020202020204" pitchFamily="34" charset="0"/>
-              <a:buChar char="•"/>
-              <a:defRPr sz="1800" kern="1200">
-                <a:solidFill>
-                  <a:schemeClr val="tx1"/>
-                </a:solidFill>
-                <a:latin typeface="+mn-lt"/>
-                <a:ea typeface="+mn-ea"/>
-                <a:cs typeface="+mn-cs"/>
-              </a:defRPr>
-            </a:lvl7pPr>
-            <a:lvl8pPr marL="3429000" indent="-228600" algn="l" defTabSz="914400" rtl="0" eaLnBrk="1" latinLnBrk="0" hangingPunct="1">
-              <a:lnSpc>
-                <a:spcPct val="90000"/>
-              </a:lnSpc>
-              <a:spcBef>
-                <a:spcPts val="500"/>
-              </a:spcBef>
-              <a:buFont typeface="Arial" panose="020B0604020202020204" pitchFamily="34" charset="0"/>
-              <a:buChar char="•"/>
-              <a:defRPr sz="1800" kern="1200">
-                <a:solidFill>
-                  <a:schemeClr val="tx1"/>
-                </a:solidFill>
-                <a:latin typeface="+mn-lt"/>
-                <a:ea typeface="+mn-ea"/>
-                <a:cs typeface="+mn-cs"/>
-              </a:defRPr>
-            </a:lvl8pPr>
-            <a:lvl9pPr marL="3886200" indent="-228600" algn="l" defTabSz="914400" rtl="0" eaLnBrk="1" latinLnBrk="0" hangingPunct="1">
-              <a:lnSpc>
-                <a:spcPct val="90000"/>
-              </a:lnSpc>
-              <a:spcBef>
-                <a:spcPts val="500"/>
-              </a:spcBef>
-              <a:buFont typeface="Arial" panose="020B0604020202020204" pitchFamily="34" charset="0"/>
-              <a:buChar char="•"/>
-              <a:defRPr sz="1800" kern="1200">
-                <a:solidFill>
-                  <a:schemeClr val="tx1"/>
-                </a:solidFill>
-                <a:latin typeface="+mn-lt"/>
-                <a:ea typeface="+mn-ea"/>
-                <a:cs typeface="+mn-cs"/>
-              </a:defRPr>
-            </a:lvl9pPr>
-          </a:lstStyle>
-          <a:p>
-            <a:pPr marL="0" indent="0" algn="ctr">
-              <a:buFont typeface="Arial" panose="020B0604020202020204" pitchFamily="34" charset="0"/>
-              <a:buNone/>
-            </a:pPr>
-            <a:endParaRPr lang="en-US" sz="4000" dirty="0">
-              <a:latin typeface="+mj-lt"/>
-            </a:endParaRPr>
-          </a:p>
-          <a:p>
-            <a:pPr marL="0" indent="0" algn="ctr">
-              <a:buFont typeface="Arial" panose="020B0604020202020204" pitchFamily="34" charset="0"/>
-              <a:buNone/>
-            </a:pPr>
-            <a:endParaRPr lang="en-US" sz="4000" dirty="0">
-              <a:latin typeface="+mj-lt"/>
-            </a:endParaRPr>
-          </a:p>
-          <a:p>
-            <a:pPr marL="0" indent="0" algn="ctr">
-              <a:buFont typeface="Arial" panose="020B0604020202020204" pitchFamily="34" charset="0"/>
-              <a:buNone/>
-            </a:pPr>
-            <a:r>
-              <a:rPr lang="en-US" sz="4000" i="1" dirty="0">
-                <a:latin typeface="+mj-lt"/>
-              </a:rPr>
-              <a:t>“The human genome is only on the order of a gigabyte of data, which is a tiny little database. If you take the entire living biosphere…about one petabyte…that’s still very small compared with Google or the Wikipedia. And somehow mother nature manages to create…this incredibly rich environment with this amazingly small amount of data.”</a:t>
-            </a:r>
-          </a:p>
-          <a:p>
-            <a:pPr marL="0" indent="0" algn="ctr">
-              <a:buFont typeface="Arial" panose="020B0604020202020204" pitchFamily="34" charset="0"/>
-              <a:buNone/>
-            </a:pPr>
-            <a:endParaRPr lang="en-US" sz="4000" i="1" dirty="0">
-              <a:latin typeface="+mj-lt"/>
-            </a:endParaRPr>
-          </a:p>
-          <a:p>
-            <a:pPr marL="0" indent="0" algn="ctr">
-              <a:buFont typeface="Arial" panose="020B0604020202020204" pitchFamily="34" charset="0"/>
-              <a:buNone/>
-            </a:pPr>
-            <a:r>
-              <a:rPr lang="en-US" sz="4000" i="1" dirty="0">
                 <a:latin typeface="+mj-lt"/>
               </a:rPr>
               <a:t>- Freeman Dyson</a:t>
             </a:r>
+          </a:p>
+          <a:p>
+            <a:pPr algn="ctr"/>
+            <a:endParaRPr lang="en-US" dirty="0"/>
           </a:p>
         </p:txBody>
       </p:sp>
@@ -4404,6 +4248,9 @@
   <p:clrMapOvr>
     <a:masterClrMapping/>
   </p:clrMapOvr>
+  <p:transition spd="slow">
+    <p:push/>
+  </p:transition>
 </p:sld>
 </file>
 
@@ -4576,31 +4423,6 @@
           </a:prstGeom>
         </p:spPr>
       </p:pic>
-      <p:sp>
-        <p:nvSpPr>
-          <p:cNvPr id="8" name="Content Placeholder 7">
-            <a:extLst>
-              <a:ext uri="{FF2B5EF4-FFF2-40B4-BE49-F238E27FC236}">
-                <a16:creationId xmlns:a16="http://schemas.microsoft.com/office/drawing/2014/main" id="{E52D8FF2-CBDE-C24E-A136-04E4A915C25A}"/>
-              </a:ext>
-            </a:extLst>
-          </p:cNvPr>
-          <p:cNvSpPr>
-            <a:spLocks noGrp="1"/>
-          </p:cNvSpPr>
-          <p:nvPr>
-            <p:ph idx="1"/>
-          </p:nvPr>
-        </p:nvSpPr>
-        <p:spPr/>
-        <p:txBody>
-          <a:bodyPr/>
-          <a:lstStyle/>
-          <a:p>
-            <a:endParaRPr lang="en-US"/>
-          </a:p>
-        </p:txBody>
-      </p:sp>
     </p:spTree>
     <p:extLst>
       <p:ext uri="{BB962C8B-B14F-4D97-AF65-F5344CB8AC3E}">
@@ -4611,6 +4433,9 @@
   <p:clrMapOvr>
     <a:masterClrMapping/>
   </p:clrMapOvr>
+  <p:transition spd="slow">
+    <p:push/>
+  </p:transition>
 </p:sld>
 </file>
 
@@ -4718,6 +4543,96 @@
           </a:p>
         </p:txBody>
       </p:sp>
+      <p:pic>
+        <p:nvPicPr>
+          <p:cNvPr id="7" name="Content Placeholder 4">
+            <a:extLst>
+              <a:ext uri="{FF2B5EF4-FFF2-40B4-BE49-F238E27FC236}">
+                <a16:creationId xmlns:a16="http://schemas.microsoft.com/office/drawing/2014/main" id="{E96295D4-3237-8540-969C-E6F4DCD9865B}"/>
+              </a:ext>
+            </a:extLst>
+          </p:cNvPr>
+          <p:cNvPicPr>
+            <a:picLocks noChangeAspect="1"/>
+          </p:cNvPicPr>
+          <p:nvPr/>
+        </p:nvPicPr>
+        <p:blipFill>
+          <a:blip r:embed="rId3"/>
+          <a:stretch>
+            <a:fillRect/>
+          </a:stretch>
+        </p:blipFill>
+        <p:spPr>
+          <a:xfrm rot="5400000">
+            <a:off x="1491488" y="-1135063"/>
+            <a:ext cx="682562" cy="4351338"/>
+          </a:xfrm>
+          <a:prstGeom prst="rect">
+            <a:avLst/>
+          </a:prstGeom>
+        </p:spPr>
+      </p:pic>
+      <p:pic>
+        <p:nvPicPr>
+          <p:cNvPr id="8" name="Content Placeholder 4">
+            <a:extLst>
+              <a:ext uri="{FF2B5EF4-FFF2-40B4-BE49-F238E27FC236}">
+                <a16:creationId xmlns:a16="http://schemas.microsoft.com/office/drawing/2014/main" id="{677BB418-319E-BD41-B6C0-9EBF9FA0A966}"/>
+              </a:ext>
+            </a:extLst>
+          </p:cNvPr>
+          <p:cNvPicPr>
+            <a:picLocks noChangeAspect="1"/>
+          </p:cNvPicPr>
+          <p:nvPr/>
+        </p:nvPicPr>
+        <p:blipFill>
+          <a:blip r:embed="rId3"/>
+          <a:stretch>
+            <a:fillRect/>
+          </a:stretch>
+        </p:blipFill>
+        <p:spPr>
+          <a:xfrm rot="5400000">
+            <a:off x="5842826" y="-1130511"/>
+            <a:ext cx="682562" cy="4351338"/>
+          </a:xfrm>
+          <a:prstGeom prst="rect">
+            <a:avLst/>
+          </a:prstGeom>
+        </p:spPr>
+      </p:pic>
+      <p:pic>
+        <p:nvPicPr>
+          <p:cNvPr id="9" name="Content Placeholder 4">
+            <a:extLst>
+              <a:ext uri="{FF2B5EF4-FFF2-40B4-BE49-F238E27FC236}">
+                <a16:creationId xmlns:a16="http://schemas.microsoft.com/office/drawing/2014/main" id="{8A5CA89B-3F9E-5443-A04B-6CEB858087C9}"/>
+              </a:ext>
+            </a:extLst>
+          </p:cNvPr>
+          <p:cNvPicPr>
+            <a:picLocks noChangeAspect="1"/>
+          </p:cNvPicPr>
+          <p:nvPr/>
+        </p:nvPicPr>
+        <p:blipFill>
+          <a:blip r:embed="rId3"/>
+          <a:stretch>
+            <a:fillRect/>
+          </a:stretch>
+        </p:blipFill>
+        <p:spPr>
+          <a:xfrm rot="5400000">
+            <a:off x="10194164" y="-1130509"/>
+            <a:ext cx="682562" cy="4351338"/>
+          </a:xfrm>
+          <a:prstGeom prst="rect">
+            <a:avLst/>
+          </a:prstGeom>
+        </p:spPr>
+      </p:pic>
     </p:spTree>
     <p:extLst>
       <p:ext uri="{BB962C8B-B14F-4D97-AF65-F5344CB8AC3E}">
@@ -4728,6 +4643,9 @@
   <p:clrMapOvr>
     <a:masterClrMapping/>
   </p:clrMapOvr>
+  <p:transition spd="slow">
+    <p:push/>
+  </p:transition>
 </p:sld>
 </file>
 
@@ -4750,34 +4668,6 @@
       </p:grpSpPr>
       <p:sp>
         <p:nvSpPr>
-          <p:cNvPr id="2" name="Title 1">
-            <a:extLst>
-              <a:ext uri="{FF2B5EF4-FFF2-40B4-BE49-F238E27FC236}">
-                <a16:creationId xmlns:a16="http://schemas.microsoft.com/office/drawing/2014/main" id="{107D96BB-C100-B443-9535-66E8861FD1BC}"/>
-              </a:ext>
-            </a:extLst>
-          </p:cNvPr>
-          <p:cNvSpPr>
-            <a:spLocks noGrp="1"/>
-          </p:cNvSpPr>
-          <p:nvPr>
-            <p:ph type="title"/>
-          </p:nvPr>
-        </p:nvSpPr>
-        <p:spPr/>
-        <p:txBody>
-          <a:bodyPr/>
-          <a:lstStyle/>
-          <a:p>
-            <a:r>
-              <a:rPr lang="en-US" dirty="0"/>
-              <a:t>Model parameters</a:t>
-            </a:r>
-          </a:p>
-        </p:txBody>
-      </p:sp>
-      <p:sp>
-        <p:nvSpPr>
           <p:cNvPr id="3" name="Content Placeholder 2">
             <a:extLst>
               <a:ext uri="{FF2B5EF4-FFF2-40B4-BE49-F238E27FC236}">
@@ -4792,7 +4682,12 @@
             <p:ph idx="1"/>
           </p:nvPr>
         </p:nvSpPr>
-        <p:spPr/>
+        <p:spPr>
+          <a:xfrm>
+            <a:off x="926307" y="2173285"/>
+            <a:ext cx="10515600" cy="4351338"/>
+          </a:xfrm>
+        </p:spPr>
         <p:txBody>
           <a:bodyPr/>
           <a:lstStyle/>
@@ -4964,6 +4859,96 @@
           </a:p>
         </p:txBody>
       </p:sp>
+      <p:pic>
+        <p:nvPicPr>
+          <p:cNvPr id="5" name="Content Placeholder 4">
+            <a:extLst>
+              <a:ext uri="{FF2B5EF4-FFF2-40B4-BE49-F238E27FC236}">
+                <a16:creationId xmlns:a16="http://schemas.microsoft.com/office/drawing/2014/main" id="{B141B2B0-8023-D543-9045-0B3B4106AF14}"/>
+              </a:ext>
+            </a:extLst>
+          </p:cNvPr>
+          <p:cNvPicPr>
+            <a:picLocks noChangeAspect="1"/>
+          </p:cNvPicPr>
+          <p:nvPr/>
+        </p:nvPicPr>
+        <p:blipFill>
+          <a:blip r:embed="rId2"/>
+          <a:stretch>
+            <a:fillRect/>
+          </a:stretch>
+        </p:blipFill>
+        <p:spPr>
+          <a:xfrm rot="5400000">
+            <a:off x="1491488" y="-1130511"/>
+            <a:ext cx="682562" cy="4351338"/>
+          </a:xfrm>
+          <a:prstGeom prst="rect">
+            <a:avLst/>
+          </a:prstGeom>
+        </p:spPr>
+      </p:pic>
+      <p:pic>
+        <p:nvPicPr>
+          <p:cNvPr id="6" name="Content Placeholder 4">
+            <a:extLst>
+              <a:ext uri="{FF2B5EF4-FFF2-40B4-BE49-F238E27FC236}">
+                <a16:creationId xmlns:a16="http://schemas.microsoft.com/office/drawing/2014/main" id="{81D70639-DA9E-264D-AD02-D1AA79DE2130}"/>
+              </a:ext>
+            </a:extLst>
+          </p:cNvPr>
+          <p:cNvPicPr>
+            <a:picLocks noChangeAspect="1"/>
+          </p:cNvPicPr>
+          <p:nvPr/>
+        </p:nvPicPr>
+        <p:blipFill>
+          <a:blip r:embed="rId2"/>
+          <a:stretch>
+            <a:fillRect/>
+          </a:stretch>
+        </p:blipFill>
+        <p:spPr>
+          <a:xfrm rot="5400000">
+            <a:off x="5842826" y="-1130511"/>
+            <a:ext cx="682562" cy="4351338"/>
+          </a:xfrm>
+          <a:prstGeom prst="rect">
+            <a:avLst/>
+          </a:prstGeom>
+        </p:spPr>
+      </p:pic>
+      <p:pic>
+        <p:nvPicPr>
+          <p:cNvPr id="7" name="Content Placeholder 4">
+            <a:extLst>
+              <a:ext uri="{FF2B5EF4-FFF2-40B4-BE49-F238E27FC236}">
+                <a16:creationId xmlns:a16="http://schemas.microsoft.com/office/drawing/2014/main" id="{A7E6775A-0C14-984A-8882-AF794EB36612}"/>
+              </a:ext>
+            </a:extLst>
+          </p:cNvPr>
+          <p:cNvPicPr>
+            <a:picLocks noChangeAspect="1"/>
+          </p:cNvPicPr>
+          <p:nvPr/>
+        </p:nvPicPr>
+        <p:blipFill>
+          <a:blip r:embed="rId2"/>
+          <a:stretch>
+            <a:fillRect/>
+          </a:stretch>
+        </p:blipFill>
+        <p:spPr>
+          <a:xfrm rot="5400000">
+            <a:off x="10194164" y="-1130509"/>
+            <a:ext cx="682562" cy="4351338"/>
+          </a:xfrm>
+          <a:prstGeom prst="rect">
+            <a:avLst/>
+          </a:prstGeom>
+        </p:spPr>
+      </p:pic>
     </p:spTree>
     <p:extLst>
       <p:ext uri="{BB962C8B-B14F-4D97-AF65-F5344CB8AC3E}">
@@ -4974,6 +4959,9 @@
   <p:clrMapOvr>
     <a:masterClrMapping/>
   </p:clrMapOvr>
+  <p:transition spd="slow">
+    <p:push/>
+  </p:transition>
 </p:sld>
 </file>
 
@@ -5015,7 +5003,7 @@
         </p:blipFill>
         <p:spPr>
           <a:xfrm>
-            <a:off x="4041271" y="1332125"/>
+            <a:off x="4041271" y="1675025"/>
             <a:ext cx="3978670" cy="3989175"/>
           </a:xfrm>
           <a:prstGeom prst="rect">
@@ -5044,7 +5032,7 @@
         </p:blipFill>
         <p:spPr>
           <a:xfrm>
-            <a:off x="185245" y="1332125"/>
+            <a:off x="185245" y="1675025"/>
             <a:ext cx="3804998" cy="3989175"/>
           </a:xfrm>
           <a:prstGeom prst="rect">
@@ -5073,7 +5061,7 @@
         </p:blipFill>
         <p:spPr>
           <a:xfrm>
-            <a:off x="7896612" y="1332125"/>
+            <a:off x="7896612" y="1675025"/>
             <a:ext cx="3836575" cy="3989175"/>
           </a:xfrm>
           <a:prstGeom prst="rect">
@@ -5110,6 +5098,96 @@
           </a:p>
         </p:txBody>
       </p:sp>
+      <p:pic>
+        <p:nvPicPr>
+          <p:cNvPr id="8" name="Content Placeholder 4">
+            <a:extLst>
+              <a:ext uri="{FF2B5EF4-FFF2-40B4-BE49-F238E27FC236}">
+                <a16:creationId xmlns:a16="http://schemas.microsoft.com/office/drawing/2014/main" id="{14D4DDF7-7579-0247-B761-899EC4AD2831}"/>
+              </a:ext>
+            </a:extLst>
+          </p:cNvPr>
+          <p:cNvPicPr>
+            <a:picLocks noChangeAspect="1"/>
+          </p:cNvPicPr>
+          <p:nvPr/>
+        </p:nvPicPr>
+        <p:blipFill>
+          <a:blip r:embed="rId5"/>
+          <a:stretch>
+            <a:fillRect/>
+          </a:stretch>
+        </p:blipFill>
+        <p:spPr>
+          <a:xfrm rot="5400000">
+            <a:off x="1491488" y="-1135063"/>
+            <a:ext cx="682562" cy="4351338"/>
+          </a:xfrm>
+          <a:prstGeom prst="rect">
+            <a:avLst/>
+          </a:prstGeom>
+        </p:spPr>
+      </p:pic>
+      <p:pic>
+        <p:nvPicPr>
+          <p:cNvPr id="9" name="Content Placeholder 4">
+            <a:extLst>
+              <a:ext uri="{FF2B5EF4-FFF2-40B4-BE49-F238E27FC236}">
+                <a16:creationId xmlns:a16="http://schemas.microsoft.com/office/drawing/2014/main" id="{1392F29F-4C01-DE4F-A72E-8D4D5441A79E}"/>
+              </a:ext>
+            </a:extLst>
+          </p:cNvPr>
+          <p:cNvPicPr>
+            <a:picLocks noChangeAspect="1"/>
+          </p:cNvPicPr>
+          <p:nvPr/>
+        </p:nvPicPr>
+        <p:blipFill>
+          <a:blip r:embed="rId5"/>
+          <a:stretch>
+            <a:fillRect/>
+          </a:stretch>
+        </p:blipFill>
+        <p:spPr>
+          <a:xfrm rot="5400000">
+            <a:off x="5842826" y="-1130511"/>
+            <a:ext cx="682562" cy="4351338"/>
+          </a:xfrm>
+          <a:prstGeom prst="rect">
+            <a:avLst/>
+          </a:prstGeom>
+        </p:spPr>
+      </p:pic>
+      <p:pic>
+        <p:nvPicPr>
+          <p:cNvPr id="10" name="Content Placeholder 4">
+            <a:extLst>
+              <a:ext uri="{FF2B5EF4-FFF2-40B4-BE49-F238E27FC236}">
+                <a16:creationId xmlns:a16="http://schemas.microsoft.com/office/drawing/2014/main" id="{B3993A3A-07AA-5041-A33C-989A43FC1ADA}"/>
+              </a:ext>
+            </a:extLst>
+          </p:cNvPr>
+          <p:cNvPicPr>
+            <a:picLocks noChangeAspect="1"/>
+          </p:cNvPicPr>
+          <p:nvPr/>
+        </p:nvPicPr>
+        <p:blipFill>
+          <a:blip r:embed="rId5"/>
+          <a:stretch>
+            <a:fillRect/>
+          </a:stretch>
+        </p:blipFill>
+        <p:spPr>
+          <a:xfrm rot="5400000">
+            <a:off x="10194164" y="-1130509"/>
+            <a:ext cx="682562" cy="4351338"/>
+          </a:xfrm>
+          <a:prstGeom prst="rect">
+            <a:avLst/>
+          </a:prstGeom>
+        </p:spPr>
+      </p:pic>
     </p:spTree>
     <p:extLst>
       <p:ext uri="{BB962C8B-B14F-4D97-AF65-F5344CB8AC3E}">
@@ -5120,6 +5198,9 @@
   <p:clrMapOvr>
     <a:masterClrMapping/>
   </p:clrMapOvr>
+  <p:transition spd="slow">
+    <p:push/>
+  </p:transition>
 </p:sld>
 </file>
 
@@ -5162,7 +5243,7 @@
         </p:blipFill>
         <p:spPr>
           <a:xfrm>
-            <a:off x="5717400" y="1175804"/>
+            <a:off x="5717400" y="1417104"/>
             <a:ext cx="6474600" cy="4313064"/>
           </a:xfrm>
           <a:prstGeom prst="rect">
@@ -5192,7 +5273,7 @@
         </p:blipFill>
         <p:spPr>
           <a:xfrm>
-            <a:off x="0" y="1175804"/>
+            <a:off x="0" y="1417104"/>
             <a:ext cx="6474600" cy="4313064"/>
           </a:xfrm>
           <a:prstGeom prst="rect">
@@ -5229,6 +5310,96 @@
           </a:p>
         </p:txBody>
       </p:sp>
+      <p:pic>
+        <p:nvPicPr>
+          <p:cNvPr id="7" name="Content Placeholder 4">
+            <a:extLst>
+              <a:ext uri="{FF2B5EF4-FFF2-40B4-BE49-F238E27FC236}">
+                <a16:creationId xmlns:a16="http://schemas.microsoft.com/office/drawing/2014/main" id="{C37280F3-2302-2C4D-8D16-0F24158CD823}"/>
+              </a:ext>
+            </a:extLst>
+          </p:cNvPr>
+          <p:cNvPicPr>
+            <a:picLocks noChangeAspect="1"/>
+          </p:cNvPicPr>
+          <p:nvPr/>
+        </p:nvPicPr>
+        <p:blipFill>
+          <a:blip r:embed="rId4"/>
+          <a:stretch>
+            <a:fillRect/>
+          </a:stretch>
+        </p:blipFill>
+        <p:spPr>
+          <a:xfrm rot="5400000">
+            <a:off x="1491488" y="-1135063"/>
+            <a:ext cx="682562" cy="4351338"/>
+          </a:xfrm>
+          <a:prstGeom prst="rect">
+            <a:avLst/>
+          </a:prstGeom>
+        </p:spPr>
+      </p:pic>
+      <p:pic>
+        <p:nvPicPr>
+          <p:cNvPr id="8" name="Content Placeholder 4">
+            <a:extLst>
+              <a:ext uri="{FF2B5EF4-FFF2-40B4-BE49-F238E27FC236}">
+                <a16:creationId xmlns:a16="http://schemas.microsoft.com/office/drawing/2014/main" id="{26481FEE-D912-974C-820C-8ED32AAAA58C}"/>
+              </a:ext>
+            </a:extLst>
+          </p:cNvPr>
+          <p:cNvPicPr>
+            <a:picLocks noChangeAspect="1"/>
+          </p:cNvPicPr>
+          <p:nvPr/>
+        </p:nvPicPr>
+        <p:blipFill>
+          <a:blip r:embed="rId4"/>
+          <a:stretch>
+            <a:fillRect/>
+          </a:stretch>
+        </p:blipFill>
+        <p:spPr>
+          <a:xfrm rot="5400000">
+            <a:off x="5842826" y="-1130511"/>
+            <a:ext cx="682562" cy="4351338"/>
+          </a:xfrm>
+          <a:prstGeom prst="rect">
+            <a:avLst/>
+          </a:prstGeom>
+        </p:spPr>
+      </p:pic>
+      <p:pic>
+        <p:nvPicPr>
+          <p:cNvPr id="9" name="Content Placeholder 4">
+            <a:extLst>
+              <a:ext uri="{FF2B5EF4-FFF2-40B4-BE49-F238E27FC236}">
+                <a16:creationId xmlns:a16="http://schemas.microsoft.com/office/drawing/2014/main" id="{898AD83E-A2C9-9342-AAF1-2269D38F885D}"/>
+              </a:ext>
+            </a:extLst>
+          </p:cNvPr>
+          <p:cNvPicPr>
+            <a:picLocks noChangeAspect="1"/>
+          </p:cNvPicPr>
+          <p:nvPr/>
+        </p:nvPicPr>
+        <p:blipFill>
+          <a:blip r:embed="rId4"/>
+          <a:stretch>
+            <a:fillRect/>
+          </a:stretch>
+        </p:blipFill>
+        <p:spPr>
+          <a:xfrm rot="5400000">
+            <a:off x="10194164" y="-1130509"/>
+            <a:ext cx="682562" cy="4351338"/>
+          </a:xfrm>
+          <a:prstGeom prst="rect">
+            <a:avLst/>
+          </a:prstGeom>
+        </p:spPr>
+      </p:pic>
     </p:spTree>
     <p:extLst>
       <p:ext uri="{BB962C8B-B14F-4D97-AF65-F5344CB8AC3E}">
@@ -5239,6 +5410,9 @@
   <p:clrMapOvr>
     <a:masterClrMapping/>
   </p:clrMapOvr>
+  <p:transition spd="slow">
+    <p:push/>
+  </p:transition>
 </p:sld>
 </file>
 
@@ -5281,8 +5455,8 @@
         </p:blipFill>
         <p:spPr>
           <a:xfrm>
-            <a:off x="2074750" y="481712"/>
-            <a:ext cx="7571500" cy="6057200"/>
+            <a:off x="3025184" y="1776413"/>
+            <a:ext cx="5935265" cy="4748212"/>
           </a:xfrm>
           <a:prstGeom prst="rect">
             <a:avLst/>
@@ -5318,6 +5492,96 @@
           </a:p>
         </p:txBody>
       </p:sp>
+      <p:pic>
+        <p:nvPicPr>
+          <p:cNvPr id="4" name="Content Placeholder 4">
+            <a:extLst>
+              <a:ext uri="{FF2B5EF4-FFF2-40B4-BE49-F238E27FC236}">
+                <a16:creationId xmlns:a16="http://schemas.microsoft.com/office/drawing/2014/main" id="{330A53D5-57C5-ED47-BA3E-81333BB43C31}"/>
+              </a:ext>
+            </a:extLst>
+          </p:cNvPr>
+          <p:cNvPicPr>
+            <a:picLocks noChangeAspect="1"/>
+          </p:cNvPicPr>
+          <p:nvPr/>
+        </p:nvPicPr>
+        <p:blipFill>
+          <a:blip r:embed="rId3"/>
+          <a:stretch>
+            <a:fillRect/>
+          </a:stretch>
+        </p:blipFill>
+        <p:spPr>
+          <a:xfrm rot="5400000">
+            <a:off x="1491488" y="-1135063"/>
+            <a:ext cx="682562" cy="4351338"/>
+          </a:xfrm>
+          <a:prstGeom prst="rect">
+            <a:avLst/>
+          </a:prstGeom>
+        </p:spPr>
+      </p:pic>
+      <p:pic>
+        <p:nvPicPr>
+          <p:cNvPr id="5" name="Content Placeholder 4">
+            <a:extLst>
+              <a:ext uri="{FF2B5EF4-FFF2-40B4-BE49-F238E27FC236}">
+                <a16:creationId xmlns:a16="http://schemas.microsoft.com/office/drawing/2014/main" id="{8CE44E0F-FF5F-7847-ABE2-F846E28B0E1C}"/>
+              </a:ext>
+            </a:extLst>
+          </p:cNvPr>
+          <p:cNvPicPr>
+            <a:picLocks noChangeAspect="1"/>
+          </p:cNvPicPr>
+          <p:nvPr/>
+        </p:nvPicPr>
+        <p:blipFill>
+          <a:blip r:embed="rId3"/>
+          <a:stretch>
+            <a:fillRect/>
+          </a:stretch>
+        </p:blipFill>
+        <p:spPr>
+          <a:xfrm rot="5400000">
+            <a:off x="5842826" y="-1130511"/>
+            <a:ext cx="682562" cy="4351338"/>
+          </a:xfrm>
+          <a:prstGeom prst="rect">
+            <a:avLst/>
+          </a:prstGeom>
+        </p:spPr>
+      </p:pic>
+      <p:pic>
+        <p:nvPicPr>
+          <p:cNvPr id="6" name="Content Placeholder 4">
+            <a:extLst>
+              <a:ext uri="{FF2B5EF4-FFF2-40B4-BE49-F238E27FC236}">
+                <a16:creationId xmlns:a16="http://schemas.microsoft.com/office/drawing/2014/main" id="{6BE92B8C-B9B8-194E-9C17-95ABB00ED6AB}"/>
+              </a:ext>
+            </a:extLst>
+          </p:cNvPr>
+          <p:cNvPicPr>
+            <a:picLocks noChangeAspect="1"/>
+          </p:cNvPicPr>
+          <p:nvPr/>
+        </p:nvPicPr>
+        <p:blipFill>
+          <a:blip r:embed="rId3"/>
+          <a:stretch>
+            <a:fillRect/>
+          </a:stretch>
+        </p:blipFill>
+        <p:spPr>
+          <a:xfrm rot="5400000">
+            <a:off x="10194164" y="-1130509"/>
+            <a:ext cx="682562" cy="4351338"/>
+          </a:xfrm>
+          <a:prstGeom prst="rect">
+            <a:avLst/>
+          </a:prstGeom>
+        </p:spPr>
+      </p:pic>
     </p:spTree>
     <p:extLst>
       <p:ext uri="{BB962C8B-B14F-4D97-AF65-F5344CB8AC3E}">
@@ -5328,6 +5592,9 @@
   <p:clrMapOvr>
     <a:masterClrMapping/>
   </p:clrMapOvr>
+  <p:transition spd="slow">
+    <p:push/>
+  </p:transition>
 </p:sld>
 </file>
 
@@ -5380,10 +5647,10 @@
       </p:pic>
       <p:pic>
         <p:nvPicPr>
-          <p:cNvPr id="3" name="Picture 2">
-            <a:extLst>
-              <a:ext uri="{FF2B5EF4-FFF2-40B4-BE49-F238E27FC236}">
-                <a16:creationId xmlns:a16="http://schemas.microsoft.com/office/drawing/2014/main" id="{1C836A23-F6EA-E644-B02D-F9C2649721B0}"/>
+          <p:cNvPr id="4" name="Picture 3">
+            <a:extLst>
+              <a:ext uri="{FF2B5EF4-FFF2-40B4-BE49-F238E27FC236}">
+                <a16:creationId xmlns:a16="http://schemas.microsoft.com/office/drawing/2014/main" id="{3E60603C-51C9-4948-87D7-77379CB162B4}"/>
               </a:ext>
             </a:extLst>
           </p:cNvPr>
@@ -5400,7 +5667,7 @@
         </p:blipFill>
         <p:spPr>
           <a:xfrm>
-            <a:off x="6330100" y="193850"/>
+            <a:off x="832050" y="3546475"/>
             <a:ext cx="4762500" cy="3175000"/>
           </a:xfrm>
           <a:prstGeom prst="rect">
@@ -5408,12 +5675,41 @@
           </a:prstGeom>
         </p:spPr>
       </p:pic>
+      <p:sp>
+        <p:nvSpPr>
+          <p:cNvPr id="6" name="Slide Number Placeholder 5">
+            <a:extLst>
+              <a:ext uri="{FF2B5EF4-FFF2-40B4-BE49-F238E27FC236}">
+                <a16:creationId xmlns:a16="http://schemas.microsoft.com/office/drawing/2014/main" id="{26632AB1-2F28-6A42-92C3-AB2862884875}"/>
+              </a:ext>
+            </a:extLst>
+          </p:cNvPr>
+          <p:cNvSpPr>
+            <a:spLocks noGrp="1"/>
+          </p:cNvSpPr>
+          <p:nvPr>
+            <p:ph type="sldNum" sz="quarter" idx="12"/>
+          </p:nvPr>
+        </p:nvSpPr>
+        <p:spPr/>
+        <p:txBody>
+          <a:bodyPr/>
+          <a:lstStyle/>
+          <a:p>
+            <a:fld id="{052702CF-B793-8841-9D68-A44C3863FEDD}" type="slidenum">
+              <a:rPr lang="en-US" smtClean="0"/>
+              <a:t>17</a:t>
+            </a:fld>
+            <a:endParaRPr lang="en-US"/>
+          </a:p>
+        </p:txBody>
+      </p:sp>
       <p:pic>
         <p:nvPicPr>
-          <p:cNvPr id="4" name="Picture 3">
-            <a:extLst>
-              <a:ext uri="{FF2B5EF4-FFF2-40B4-BE49-F238E27FC236}">
-                <a16:creationId xmlns:a16="http://schemas.microsoft.com/office/drawing/2014/main" id="{3E60603C-51C9-4948-87D7-77379CB162B4}"/>
+          <p:cNvPr id="7" name="Content Placeholder 4">
+            <a:extLst>
+              <a:ext uri="{FF2B5EF4-FFF2-40B4-BE49-F238E27FC236}">
+                <a16:creationId xmlns:a16="http://schemas.microsoft.com/office/drawing/2014/main" id="{CFC81969-2EDE-5040-9A20-D3D8FD90D17F}"/>
               </a:ext>
             </a:extLst>
           </p:cNvPr>
@@ -5429,9 +5725,9 @@
           </a:stretch>
         </p:blipFill>
         <p:spPr>
-          <a:xfrm>
-            <a:off x="832050" y="3546475"/>
-            <a:ext cx="4762500" cy="3175000"/>
+          <a:xfrm rot="5400000">
+            <a:off x="1491488" y="-1135063"/>
+            <a:ext cx="682562" cy="4351338"/>
           </a:xfrm>
           <a:prstGeom prst="rect">
             <a:avLst/>
@@ -5440,10 +5736,70 @@
       </p:pic>
       <p:pic>
         <p:nvPicPr>
-          <p:cNvPr id="5" name="Picture 4">
-            <a:extLst>
-              <a:ext uri="{FF2B5EF4-FFF2-40B4-BE49-F238E27FC236}">
-                <a16:creationId xmlns:a16="http://schemas.microsoft.com/office/drawing/2014/main" id="{DED35832-D4F8-B94F-9431-E8A7F0007EB2}"/>
+          <p:cNvPr id="8" name="Content Placeholder 4">
+            <a:extLst>
+              <a:ext uri="{FF2B5EF4-FFF2-40B4-BE49-F238E27FC236}">
+                <a16:creationId xmlns:a16="http://schemas.microsoft.com/office/drawing/2014/main" id="{6E8A8B88-EE2D-994C-94CD-EF346ACF7992}"/>
+              </a:ext>
+            </a:extLst>
+          </p:cNvPr>
+          <p:cNvPicPr>
+            <a:picLocks noChangeAspect="1"/>
+          </p:cNvPicPr>
+          <p:nvPr/>
+        </p:nvPicPr>
+        <p:blipFill>
+          <a:blip r:embed="rId4"/>
+          <a:stretch>
+            <a:fillRect/>
+          </a:stretch>
+        </p:blipFill>
+        <p:spPr>
+          <a:xfrm rot="5400000">
+            <a:off x="5842826" y="-1130511"/>
+            <a:ext cx="682562" cy="4351338"/>
+          </a:xfrm>
+          <a:prstGeom prst="rect">
+            <a:avLst/>
+          </a:prstGeom>
+        </p:spPr>
+      </p:pic>
+      <p:pic>
+        <p:nvPicPr>
+          <p:cNvPr id="9" name="Content Placeholder 4">
+            <a:extLst>
+              <a:ext uri="{FF2B5EF4-FFF2-40B4-BE49-F238E27FC236}">
+                <a16:creationId xmlns:a16="http://schemas.microsoft.com/office/drawing/2014/main" id="{274FCD01-1EA6-6047-B779-B40E7EABD42C}"/>
+              </a:ext>
+            </a:extLst>
+          </p:cNvPr>
+          <p:cNvPicPr>
+            <a:picLocks noChangeAspect="1"/>
+          </p:cNvPicPr>
+          <p:nvPr/>
+        </p:nvPicPr>
+        <p:blipFill>
+          <a:blip r:embed="rId4"/>
+          <a:stretch>
+            <a:fillRect/>
+          </a:stretch>
+        </p:blipFill>
+        <p:spPr>
+          <a:xfrm rot="5400000">
+            <a:off x="10194164" y="-1130509"/>
+            <a:ext cx="682562" cy="4351338"/>
+          </a:xfrm>
+          <a:prstGeom prst="rect">
+            <a:avLst/>
+          </a:prstGeom>
+        </p:spPr>
+      </p:pic>
+      <p:pic>
+        <p:nvPicPr>
+          <p:cNvPr id="3" name="Picture 2">
+            <a:extLst>
+              <a:ext uri="{FF2B5EF4-FFF2-40B4-BE49-F238E27FC236}">
+                <a16:creationId xmlns:a16="http://schemas.microsoft.com/office/drawing/2014/main" id="{1C836A23-F6EA-E644-B02D-F9C2649721B0}"/>
               </a:ext>
             </a:extLst>
           </p:cNvPr>
@@ -5460,7 +5816,7 @@
         </p:blipFill>
         <p:spPr>
           <a:xfrm>
-            <a:off x="832050" y="173000"/>
+            <a:off x="6330100" y="193850"/>
             <a:ext cx="4762500" cy="3175000"/>
           </a:xfrm>
           <a:prstGeom prst="rect">
@@ -5468,35 +5824,36 @@
           </a:prstGeom>
         </p:spPr>
       </p:pic>
-      <p:sp>
-        <p:nvSpPr>
-          <p:cNvPr id="6" name="Slide Number Placeholder 5">
-            <a:extLst>
-              <a:ext uri="{FF2B5EF4-FFF2-40B4-BE49-F238E27FC236}">
-                <a16:creationId xmlns:a16="http://schemas.microsoft.com/office/drawing/2014/main" id="{26632AB1-2F28-6A42-92C3-AB2862884875}"/>
-              </a:ext>
-            </a:extLst>
-          </p:cNvPr>
-          <p:cNvSpPr>
-            <a:spLocks noGrp="1"/>
-          </p:cNvSpPr>
-          <p:nvPr>
-            <p:ph type="sldNum" sz="quarter" idx="12"/>
-          </p:nvPr>
-        </p:nvSpPr>
-        <p:spPr/>
-        <p:txBody>
-          <a:bodyPr/>
-          <a:lstStyle/>
-          <a:p>
-            <a:fld id="{052702CF-B793-8841-9D68-A44C3863FEDD}" type="slidenum">
-              <a:rPr lang="en-US" smtClean="0"/>
-              <a:t>17</a:t>
-            </a:fld>
-            <a:endParaRPr lang="en-US"/>
-          </a:p>
-        </p:txBody>
-      </p:sp>
+      <p:pic>
+        <p:nvPicPr>
+          <p:cNvPr id="5" name="Picture 4">
+            <a:extLst>
+              <a:ext uri="{FF2B5EF4-FFF2-40B4-BE49-F238E27FC236}">
+                <a16:creationId xmlns:a16="http://schemas.microsoft.com/office/drawing/2014/main" id="{DED35832-D4F8-B94F-9431-E8A7F0007EB2}"/>
+              </a:ext>
+            </a:extLst>
+          </p:cNvPr>
+          <p:cNvPicPr>
+            <a:picLocks noChangeAspect="1"/>
+          </p:cNvPicPr>
+          <p:nvPr/>
+        </p:nvPicPr>
+        <p:blipFill>
+          <a:blip r:embed="rId6"/>
+          <a:stretch>
+            <a:fillRect/>
+          </a:stretch>
+        </p:blipFill>
+        <p:spPr>
+          <a:xfrm>
+            <a:off x="832050" y="173000"/>
+            <a:ext cx="4762500" cy="3175000"/>
+          </a:xfrm>
+          <a:prstGeom prst="rect">
+            <a:avLst/>
+          </a:prstGeom>
+        </p:spPr>
+      </p:pic>
     </p:spTree>
     <p:extLst>
       <p:ext uri="{BB962C8B-B14F-4D97-AF65-F5344CB8AC3E}">
@@ -5507,6 +5864,9 @@
   <p:clrMapOvr>
     <a:masterClrMapping/>
   </p:clrMapOvr>
+  <p:transition spd="slow">
+    <p:push/>
+  </p:transition>
 </p:sld>
 </file>
 
@@ -5577,8 +5937,98 @@
         </p:blipFill>
         <p:spPr>
           <a:xfrm>
-            <a:off x="2781300" y="740387"/>
-            <a:ext cx="6134100" cy="5399939"/>
+            <a:off x="3393778" y="1739900"/>
+            <a:ext cx="5229522" cy="4603626"/>
+          </a:xfrm>
+          <a:prstGeom prst="rect">
+            <a:avLst/>
+          </a:prstGeom>
+        </p:spPr>
+      </p:pic>
+      <p:pic>
+        <p:nvPicPr>
+          <p:cNvPr id="6" name="Content Placeholder 4">
+            <a:extLst>
+              <a:ext uri="{FF2B5EF4-FFF2-40B4-BE49-F238E27FC236}">
+                <a16:creationId xmlns:a16="http://schemas.microsoft.com/office/drawing/2014/main" id="{A5B9B2C7-FE2A-6F47-9A5F-D498E0138430}"/>
+              </a:ext>
+            </a:extLst>
+          </p:cNvPr>
+          <p:cNvPicPr>
+            <a:picLocks noChangeAspect="1"/>
+          </p:cNvPicPr>
+          <p:nvPr/>
+        </p:nvPicPr>
+        <p:blipFill>
+          <a:blip r:embed="rId3"/>
+          <a:stretch>
+            <a:fillRect/>
+          </a:stretch>
+        </p:blipFill>
+        <p:spPr>
+          <a:xfrm rot="5400000">
+            <a:off x="1491488" y="-1135063"/>
+            <a:ext cx="682562" cy="4351338"/>
+          </a:xfrm>
+          <a:prstGeom prst="rect">
+            <a:avLst/>
+          </a:prstGeom>
+        </p:spPr>
+      </p:pic>
+      <p:pic>
+        <p:nvPicPr>
+          <p:cNvPr id="7" name="Content Placeholder 4">
+            <a:extLst>
+              <a:ext uri="{FF2B5EF4-FFF2-40B4-BE49-F238E27FC236}">
+                <a16:creationId xmlns:a16="http://schemas.microsoft.com/office/drawing/2014/main" id="{B8C885D1-0DC6-EE47-9259-7623BC2F4BB4}"/>
+              </a:ext>
+            </a:extLst>
+          </p:cNvPr>
+          <p:cNvPicPr>
+            <a:picLocks noChangeAspect="1"/>
+          </p:cNvPicPr>
+          <p:nvPr/>
+        </p:nvPicPr>
+        <p:blipFill>
+          <a:blip r:embed="rId3"/>
+          <a:stretch>
+            <a:fillRect/>
+          </a:stretch>
+        </p:blipFill>
+        <p:spPr>
+          <a:xfrm rot="5400000">
+            <a:off x="5842826" y="-1130511"/>
+            <a:ext cx="682562" cy="4351338"/>
+          </a:xfrm>
+          <a:prstGeom prst="rect">
+            <a:avLst/>
+          </a:prstGeom>
+        </p:spPr>
+      </p:pic>
+      <p:pic>
+        <p:nvPicPr>
+          <p:cNvPr id="8" name="Content Placeholder 4">
+            <a:extLst>
+              <a:ext uri="{FF2B5EF4-FFF2-40B4-BE49-F238E27FC236}">
+                <a16:creationId xmlns:a16="http://schemas.microsoft.com/office/drawing/2014/main" id="{87E4E365-ED7B-5148-A197-A0AF5AB3B770}"/>
+              </a:ext>
+            </a:extLst>
+          </p:cNvPr>
+          <p:cNvPicPr>
+            <a:picLocks noChangeAspect="1"/>
+          </p:cNvPicPr>
+          <p:nvPr/>
+        </p:nvPicPr>
+        <p:blipFill>
+          <a:blip r:embed="rId3"/>
+          <a:stretch>
+            <a:fillRect/>
+          </a:stretch>
+        </p:blipFill>
+        <p:spPr>
+          <a:xfrm rot="5400000">
+            <a:off x="10194164" y="-1130509"/>
+            <a:ext cx="682562" cy="4351338"/>
           </a:xfrm>
           <a:prstGeom prst="rect">
             <a:avLst/>
@@ -5595,6 +6045,9 @@
   <p:clrMapOvr>
     <a:masterClrMapping/>
   </p:clrMapOvr>
+  <p:transition spd="slow">
+    <p:push/>
+  </p:transition>
 </p:sld>
 </file>
 
@@ -5658,7 +6111,7 @@
         </p:nvSpPr>
         <p:spPr>
           <a:xfrm>
-            <a:off x="3390900" y="1410206"/>
+            <a:off x="3352800" y="1930906"/>
             <a:ext cx="6096000" cy="3785652"/>
           </a:xfrm>
           <a:prstGeom prst="rect">
@@ -5766,6 +6219,96 @@
           </a:p>
         </p:txBody>
       </p:sp>
+      <p:pic>
+        <p:nvPicPr>
+          <p:cNvPr id="4" name="Content Placeholder 4">
+            <a:extLst>
+              <a:ext uri="{FF2B5EF4-FFF2-40B4-BE49-F238E27FC236}">
+                <a16:creationId xmlns:a16="http://schemas.microsoft.com/office/drawing/2014/main" id="{E2B526C6-A231-5A47-A009-5425BF04A671}"/>
+              </a:ext>
+            </a:extLst>
+          </p:cNvPr>
+          <p:cNvPicPr>
+            <a:picLocks noChangeAspect="1"/>
+          </p:cNvPicPr>
+          <p:nvPr/>
+        </p:nvPicPr>
+        <p:blipFill>
+          <a:blip r:embed="rId2"/>
+          <a:stretch>
+            <a:fillRect/>
+          </a:stretch>
+        </p:blipFill>
+        <p:spPr>
+          <a:xfrm rot="5400000">
+            <a:off x="1491488" y="-1135063"/>
+            <a:ext cx="682562" cy="4351338"/>
+          </a:xfrm>
+          <a:prstGeom prst="rect">
+            <a:avLst/>
+          </a:prstGeom>
+        </p:spPr>
+      </p:pic>
+      <p:pic>
+        <p:nvPicPr>
+          <p:cNvPr id="5" name="Content Placeholder 4">
+            <a:extLst>
+              <a:ext uri="{FF2B5EF4-FFF2-40B4-BE49-F238E27FC236}">
+                <a16:creationId xmlns:a16="http://schemas.microsoft.com/office/drawing/2014/main" id="{F64249EA-8DD2-A840-9037-C240592E0491}"/>
+              </a:ext>
+            </a:extLst>
+          </p:cNvPr>
+          <p:cNvPicPr>
+            <a:picLocks noChangeAspect="1"/>
+          </p:cNvPicPr>
+          <p:nvPr/>
+        </p:nvPicPr>
+        <p:blipFill>
+          <a:blip r:embed="rId2"/>
+          <a:stretch>
+            <a:fillRect/>
+          </a:stretch>
+        </p:blipFill>
+        <p:spPr>
+          <a:xfrm rot="5400000">
+            <a:off x="5842826" y="-1130511"/>
+            <a:ext cx="682562" cy="4351338"/>
+          </a:xfrm>
+          <a:prstGeom prst="rect">
+            <a:avLst/>
+          </a:prstGeom>
+        </p:spPr>
+      </p:pic>
+      <p:pic>
+        <p:nvPicPr>
+          <p:cNvPr id="6" name="Content Placeholder 4">
+            <a:extLst>
+              <a:ext uri="{FF2B5EF4-FFF2-40B4-BE49-F238E27FC236}">
+                <a16:creationId xmlns:a16="http://schemas.microsoft.com/office/drawing/2014/main" id="{B91A4A8E-0461-194F-92E5-973C01585156}"/>
+              </a:ext>
+            </a:extLst>
+          </p:cNvPr>
+          <p:cNvPicPr>
+            <a:picLocks noChangeAspect="1"/>
+          </p:cNvPicPr>
+          <p:nvPr/>
+        </p:nvPicPr>
+        <p:blipFill>
+          <a:blip r:embed="rId2"/>
+          <a:stretch>
+            <a:fillRect/>
+          </a:stretch>
+        </p:blipFill>
+        <p:spPr>
+          <a:xfrm rot="5400000">
+            <a:off x="10194164" y="-1130509"/>
+            <a:ext cx="682562" cy="4351338"/>
+          </a:xfrm>
+          <a:prstGeom prst="rect">
+            <a:avLst/>
+          </a:prstGeom>
+        </p:spPr>
+      </p:pic>
     </p:spTree>
     <p:extLst>
       <p:ext uri="{BB962C8B-B14F-4D97-AF65-F5344CB8AC3E}">
@@ -5776,6 +6319,9 @@
   <p:clrMapOvr>
     <a:masterClrMapping/>
   </p:clrMapOvr>
+  <p:transition spd="slow">
+    <p:push/>
+  </p:transition>
 </p:sld>
 </file>
 
@@ -5962,7 +6508,7 @@
         <p:spPr>
           <a:xfrm>
             <a:off x="558800" y="1905000"/>
-            <a:ext cx="4796488" cy="3970318"/>
+            <a:ext cx="4796488" cy="4832092"/>
           </a:xfrm>
           <a:prstGeom prst="rect">
             <a:avLst/>
@@ -6019,7 +6565,7 @@
             </a:pPr>
             <a:r>
               <a:rPr lang="en-US" sz="2800" dirty="0"/>
-              <a:t>Variants might have little to no effect, or a negative effect</a:t>
+              <a:t>Variants might have little to no effect, or a negative effect (sometimes but far less often a positive effect)</a:t>
             </a:r>
           </a:p>
           <a:p>
@@ -6071,6 +6617,9 @@
   <p:clrMapOvr>
     <a:masterClrMapping/>
   </p:clrMapOvr>
+  <p:transition spd="slow">
+    <p:push/>
+  </p:transition>
 </p:sld>
 </file>
 
@@ -6510,6 +7059,9 @@
   <p:clrMapOvr>
     <a:masterClrMapping/>
   </p:clrMapOvr>
+  <p:transition spd="slow">
+    <p:push/>
+  </p:transition>
   <p:timing>
     <p:tnLst>
       <p:par>
@@ -6926,6 +7478,9 @@
   <p:clrMapOvr>
     <a:masterClrMapping/>
   </p:clrMapOvr>
+  <p:transition spd="slow">
+    <p:push/>
+  </p:transition>
 </p:sld>
 </file>
 
@@ -7169,12 +7724,24 @@
               <a:buChar char="•"/>
             </a:pPr>
             <a:r>
-              <a:rPr lang="en-US" sz="2400" b="1" dirty="0"/>
+              <a:rPr lang="en-US" sz="2400" b="1" dirty="0">
+                <a:solidFill>
+                  <a:srgbClr val="EC435D"/>
+                </a:solidFill>
+              </a:rPr>
               <a:t>Prediction Target:</a:t>
             </a:r>
             <a:r>
+              <a:rPr lang="en-US" sz="2400" dirty="0">
+                <a:solidFill>
+                  <a:srgbClr val="EC435D"/>
+                </a:solidFill>
+              </a:rPr>
+              <a:t> </a:t>
+            </a:r>
+            <a:r>
               <a:rPr lang="en-US" sz="2400" dirty="0"/>
-              <a:t> conflicting (1) or non-conflicting (0)</a:t>
+              <a:t>conflicting (1) or non-conflicting (0)</a:t>
             </a:r>
           </a:p>
           <a:p>
@@ -7257,6 +7824,9 @@
   <p:clrMapOvr>
     <a:masterClrMapping/>
   </p:clrMapOvr>
+  <p:transition spd="slow">
+    <p:push/>
+  </p:transition>
 </p:sld>
 </file>
 
@@ -7298,7 +7868,7 @@
         </p:blipFill>
         <p:spPr>
           <a:xfrm>
-            <a:off x="5994400" y="1247775"/>
+            <a:off x="6488990" y="1247775"/>
             <a:ext cx="5080000" cy="5473700"/>
           </a:xfrm>
           <a:prstGeom prst="rect">
@@ -7472,7 +8042,7 @@
         <p:spPr>
           <a:xfrm>
             <a:off x="558800" y="1905000"/>
-            <a:ext cx="5207000" cy="3970318"/>
+            <a:ext cx="5511800" cy="4401205"/>
           </a:xfrm>
           <a:prstGeom prst="rect">
             <a:avLst/>
@@ -7520,6 +8090,13 @@
               <a:buFont typeface="Arial" panose="020B0604020202020204" pitchFamily="34" charset="0"/>
               <a:buChar char="•"/>
             </a:pPr>
+            <a:endParaRPr lang="en-US" sz="2800" dirty="0"/>
+          </a:p>
+          <a:p>
+            <a:pPr marL="285750" indent="-285750">
+              <a:buFont typeface="Arial" panose="020B0604020202020204" pitchFamily="34" charset="0"/>
+              <a:buChar char="•"/>
+            </a:pPr>
             <a:r>
               <a:rPr lang="en-US" sz="2800" dirty="0"/>
               <a:t>Used </a:t>
@@ -7532,6 +8109,13 @@
               <a:rPr lang="en-US" sz="2800" dirty="0"/>
               <a:t> to tune parameters</a:t>
             </a:r>
+          </a:p>
+          <a:p>
+            <a:pPr marL="285750" indent="-285750">
+              <a:buFont typeface="Arial" panose="020B0604020202020204" pitchFamily="34" charset="0"/>
+              <a:buChar char="•"/>
+            </a:pPr>
+            <a:endParaRPr lang="en-US" sz="2800" dirty="0"/>
           </a:p>
           <a:p>
             <a:pPr marL="285750" indent="-285750">
@@ -7567,6 +8151,9 @@
   <p:clrMapOvr>
     <a:masterClrMapping/>
   </p:clrMapOvr>
+  <p:transition spd="slow">
+    <p:push/>
+  </p:transition>
 </p:sld>
 </file>
 
@@ -7863,6 +8450,9 @@
   <p:clrMapOvr>
     <a:masterClrMapping/>
   </p:clrMapOvr>
+  <p:transition spd="slow">
+    <p:push/>
+  </p:transition>
 </p:sld>
 </file>
 
@@ -8181,6 +8771,125 @@
           </a:p>
         </p:txBody>
       </p:sp>
+      <p:sp>
+        <p:nvSpPr>
+          <p:cNvPr id="14" name="TextBox 13">
+            <a:extLst>
+              <a:ext uri="{FF2B5EF4-FFF2-40B4-BE49-F238E27FC236}">
+                <a16:creationId xmlns:a16="http://schemas.microsoft.com/office/drawing/2014/main" id="{D5CCEF38-E3A4-CC4A-B0C6-E83EE342E7D1}"/>
+              </a:ext>
+            </a:extLst>
+          </p:cNvPr>
+          <p:cNvSpPr txBox="1"/>
+          <p:nvPr/>
+        </p:nvSpPr>
+        <p:spPr>
+          <a:xfrm>
+            <a:off x="8705267" y="2939074"/>
+            <a:ext cx="1460656" cy="338554"/>
+          </a:xfrm>
+          <a:prstGeom prst="rect">
+            <a:avLst/>
+          </a:prstGeom>
+          <a:noFill/>
+        </p:spPr>
+        <p:txBody>
+          <a:bodyPr wrap="square" rtlCol="0">
+            <a:spAutoFit/>
+          </a:bodyPr>
+          <a:lstStyle/>
+          <a:p>
+            <a:r>
+              <a:rPr lang="en-US" sz="1600" dirty="0"/>
+              <a:t>loss of function</a:t>
+            </a:r>
+          </a:p>
+        </p:txBody>
+      </p:sp>
+      <p:sp>
+        <p:nvSpPr>
+          <p:cNvPr id="15" name="TextBox 14">
+            <a:extLst>
+              <a:ext uri="{FF2B5EF4-FFF2-40B4-BE49-F238E27FC236}">
+                <a16:creationId xmlns:a16="http://schemas.microsoft.com/office/drawing/2014/main" id="{08046D7A-39D7-B442-844B-B24574EE9434}"/>
+              </a:ext>
+            </a:extLst>
+          </p:cNvPr>
+          <p:cNvSpPr txBox="1"/>
+          <p:nvPr/>
+        </p:nvSpPr>
+        <p:spPr>
+          <a:xfrm>
+            <a:off x="7897254" y="2295461"/>
+            <a:ext cx="1590756" cy="338554"/>
+          </a:xfrm>
+          <a:prstGeom prst="rect">
+            <a:avLst/>
+          </a:prstGeom>
+          <a:noFill/>
+          <a:ln>
+            <a:noFill/>
+          </a:ln>
+        </p:spPr>
+        <p:txBody>
+          <a:bodyPr wrap="none" rtlCol="0">
+            <a:spAutoFit/>
+          </a:bodyPr>
+          <a:lstStyle/>
+          <a:p>
+            <a:r>
+              <a:rPr lang="en-US" sz="1600" dirty="0">
+                <a:solidFill>
+                  <a:schemeClr val="bg1"/>
+                </a:solidFill>
+              </a:rPr>
+              <a:t>‘deleteriousness’</a:t>
+            </a:r>
+          </a:p>
+        </p:txBody>
+      </p:sp>
+      <p:sp>
+        <p:nvSpPr>
+          <p:cNvPr id="16" name="TextBox 15">
+            <a:extLst>
+              <a:ext uri="{FF2B5EF4-FFF2-40B4-BE49-F238E27FC236}">
+                <a16:creationId xmlns:a16="http://schemas.microsoft.com/office/drawing/2014/main" id="{CD3854B0-8E30-9E4B-8269-2F10C4C4BCFF}"/>
+              </a:ext>
+            </a:extLst>
+          </p:cNvPr>
+          <p:cNvSpPr txBox="1"/>
+          <p:nvPr/>
+        </p:nvSpPr>
+        <p:spPr>
+          <a:xfrm>
+            <a:off x="7877978" y="2611854"/>
+            <a:ext cx="1512465" cy="338554"/>
+          </a:xfrm>
+          <a:prstGeom prst="rect">
+            <a:avLst/>
+          </a:prstGeom>
+          <a:noFill/>
+          <a:ln>
+            <a:noFill/>
+          </a:ln>
+        </p:spPr>
+        <p:txBody>
+          <a:bodyPr wrap="none" rtlCol="0">
+            <a:spAutoFit/>
+          </a:bodyPr>
+          <a:lstStyle/>
+          <a:p>
+            <a:r>
+              <a:rPr lang="en-US" sz="1600" dirty="0">
+                <a:solidFill>
+                  <a:schemeClr val="bg1"/>
+                </a:solidFill>
+              </a:rPr>
+              <a:t>allele frequency</a:t>
+            </a:r>
+          </a:p>
+        </p:txBody>
+      </p:sp>
     </p:spTree>
     <p:extLst>
       <p:ext uri="{BB962C8B-B14F-4D97-AF65-F5344CB8AC3E}">
@@ -8191,6 +8900,9 @@
   <p:clrMapOvr>
     <a:masterClrMapping/>
   </p:clrMapOvr>
+  <p:transition spd="slow">
+    <p:push/>
+  </p:transition>
 </p:sld>
 </file>
 
@@ -8377,7 +9089,7 @@
         <p:spPr>
           <a:xfrm>
             <a:off x="558800" y="1905000"/>
-            <a:ext cx="9182100" cy="3539430"/>
+            <a:ext cx="9182100" cy="3970318"/>
           </a:xfrm>
           <a:prstGeom prst="rect">
             <a:avLst/>
@@ -8433,7 +9145,7 @@
             </a:pPr>
             <a:r>
               <a:rPr lang="en-US" sz="2800" dirty="0"/>
-              <a:t>(Indeed there are companies who do this sort of stuff)</a:t>
+              <a:t>(Indeed there are companies who are working on this stuff)</a:t>
             </a:r>
           </a:p>
         </p:txBody>
@@ -8448,6 +9160,9 @@
   <p:clrMapOvr>
     <a:masterClrMapping/>
   </p:clrMapOvr>
+  <p:transition spd="slow">
+    <p:push/>
+  </p:transition>
 </p:sld>
 </file>
 

</xml_diff>

<commit_message>
Final presentation as given.
</commit_message>
<xml_diff>
--- a/Presentation/GeneticVariantClassificationPres.pptx
+++ b/Presentation/GeneticVariantClassificationPres.pptx
@@ -5,7 +5,7 @@
     <p:sldMasterId id="2147483648" r:id="rId1"/>
   </p:sldMasterIdLst>
   <p:notesMasterIdLst>
-    <p:notesMasterId r:id="rId21"/>
+    <p:notesMasterId r:id="rId22"/>
   </p:notesMasterIdLst>
   <p:sldIdLst>
     <p:sldId id="256" r:id="rId2"/>
@@ -21,12 +21,13 @@
     <p:sldId id="265" r:id="rId12"/>
     <p:sldId id="266" r:id="rId13"/>
     <p:sldId id="276" r:id="rId14"/>
-    <p:sldId id="269" r:id="rId15"/>
-    <p:sldId id="270" r:id="rId16"/>
-    <p:sldId id="271" r:id="rId17"/>
-    <p:sldId id="272" r:id="rId18"/>
-    <p:sldId id="280" r:id="rId19"/>
-    <p:sldId id="273" r:id="rId20"/>
+    <p:sldId id="281" r:id="rId15"/>
+    <p:sldId id="269" r:id="rId16"/>
+    <p:sldId id="270" r:id="rId17"/>
+    <p:sldId id="271" r:id="rId18"/>
+    <p:sldId id="272" r:id="rId19"/>
+    <p:sldId id="280" r:id="rId20"/>
+    <p:sldId id="273" r:id="rId21"/>
   </p:sldIdLst>
   <p:sldSz cx="12192000" cy="6858000"/>
   <p:notesSz cx="6858000" cy="9144000"/>
@@ -4543,12 +4544,45 @@
           </a:p>
         </p:txBody>
       </p:sp>
+      <p:sp>
+        <p:nvSpPr>
+          <p:cNvPr id="10" name="Title 1">
+            <a:extLst>
+              <a:ext uri="{FF2B5EF4-FFF2-40B4-BE49-F238E27FC236}">
+                <a16:creationId xmlns:a16="http://schemas.microsoft.com/office/drawing/2014/main" id="{898593A1-09C2-8F47-A6EF-1F2E49591CBC}"/>
+              </a:ext>
+            </a:extLst>
+          </p:cNvPr>
+          <p:cNvSpPr>
+            <a:spLocks noGrp="1"/>
+          </p:cNvSpPr>
+          <p:nvPr>
+            <p:ph type="title"/>
+          </p:nvPr>
+        </p:nvSpPr>
+        <p:spPr>
+          <a:xfrm>
+            <a:off x="1676400" y="365125"/>
+            <a:ext cx="10515600" cy="1325563"/>
+          </a:xfrm>
+        </p:spPr>
+        <p:txBody>
+          <a:bodyPr/>
+          <a:lstStyle/>
+          <a:p>
+            <a:r>
+              <a:rPr lang="en-US" dirty="0"/>
+              <a:t>Variant Classification</a:t>
+            </a:r>
+          </a:p>
+        </p:txBody>
+      </p:sp>
       <p:pic>
         <p:nvPicPr>
-          <p:cNvPr id="7" name="Content Placeholder 4">
-            <a:extLst>
-              <a:ext uri="{FF2B5EF4-FFF2-40B4-BE49-F238E27FC236}">
-                <a16:creationId xmlns:a16="http://schemas.microsoft.com/office/drawing/2014/main" id="{E96295D4-3237-8540-969C-E6F4DCD9865B}"/>
+          <p:cNvPr id="11" name="Content Placeholder 4">
+            <a:extLst>
+              <a:ext uri="{FF2B5EF4-FFF2-40B4-BE49-F238E27FC236}">
+                <a16:creationId xmlns:a16="http://schemas.microsoft.com/office/drawing/2014/main" id="{BB52D204-C7F5-D940-AAB0-11DA9BAB584B}"/>
               </a:ext>
             </a:extLst>
           </p:cNvPr>
@@ -4565,7 +4599,7 @@
         </p:blipFill>
         <p:spPr>
           <a:xfrm rot="5400000">
-            <a:off x="1491488" y="-1135063"/>
+            <a:off x="-892770" y="-1147763"/>
             <a:ext cx="682562" cy="4351338"/>
           </a:xfrm>
           <a:prstGeom prst="rect">
@@ -4575,10 +4609,10 @@
       </p:pic>
       <p:pic>
         <p:nvPicPr>
-          <p:cNvPr id="8" name="Content Placeholder 4">
-            <a:extLst>
-              <a:ext uri="{FF2B5EF4-FFF2-40B4-BE49-F238E27FC236}">
-                <a16:creationId xmlns:a16="http://schemas.microsoft.com/office/drawing/2014/main" id="{677BB418-319E-BD41-B6C0-9EBF9FA0A966}"/>
+          <p:cNvPr id="12" name="Content Placeholder 4">
+            <a:extLst>
+              <a:ext uri="{FF2B5EF4-FFF2-40B4-BE49-F238E27FC236}">
+                <a16:creationId xmlns:a16="http://schemas.microsoft.com/office/drawing/2014/main" id="{5036536A-7A68-9645-9916-31804E12227E}"/>
               </a:ext>
             </a:extLst>
           </p:cNvPr>
@@ -4595,7 +4629,7 @@
         </p:blipFill>
         <p:spPr>
           <a:xfrm rot="5400000">
-            <a:off x="5842826" y="-1130511"/>
+            <a:off x="8268526" y="-1130511"/>
             <a:ext cx="682562" cy="4351338"/>
           </a:xfrm>
           <a:prstGeom prst="rect">
@@ -4605,10 +4639,10 @@
       </p:pic>
       <p:pic>
         <p:nvPicPr>
-          <p:cNvPr id="9" name="Content Placeholder 4">
-            <a:extLst>
-              <a:ext uri="{FF2B5EF4-FFF2-40B4-BE49-F238E27FC236}">
-                <a16:creationId xmlns:a16="http://schemas.microsoft.com/office/drawing/2014/main" id="{8A5CA89B-3F9E-5443-A04B-6CEB858087C9}"/>
+          <p:cNvPr id="13" name="Content Placeholder 4">
+            <a:extLst>
+              <a:ext uri="{FF2B5EF4-FFF2-40B4-BE49-F238E27FC236}">
+                <a16:creationId xmlns:a16="http://schemas.microsoft.com/office/drawing/2014/main" id="{96D77A6E-AC2F-F54E-8E39-18F6A8D55DE5}"/>
               </a:ext>
             </a:extLst>
           </p:cNvPr>
@@ -4625,7 +4659,7 @@
         </p:blipFill>
         <p:spPr>
           <a:xfrm rot="5400000">
-            <a:off x="10194164" y="-1130509"/>
+            <a:off x="12619864" y="-1130509"/>
             <a:ext cx="682562" cy="4351338"/>
           </a:xfrm>
           <a:prstGeom prst="rect">
@@ -4694,11 +4728,11 @@
           <a:p>
             <a:r>
               <a:rPr lang="en-US" dirty="0" err="1"/>
-              <a:t>knn_model</a:t>
+              <a:t>kNN</a:t>
             </a:r>
             <a:r>
               <a:rPr lang="en-US" dirty="0"/>
-              <a:t> = </a:t>
+              <a:t> : </a:t>
             </a:r>
             <a:r>
               <a:rPr lang="en-US" dirty="0" err="1"/>
@@ -4720,11 +4754,11 @@
           <a:p>
             <a:r>
               <a:rPr lang="en-US" dirty="0" err="1"/>
-              <a:t>dt_model</a:t>
+              <a:t>DecisionTree</a:t>
             </a:r>
             <a:r>
               <a:rPr lang="en-US" dirty="0"/>
-              <a:t> = </a:t>
+              <a:t> : </a:t>
             </a:r>
             <a:r>
               <a:rPr lang="en-US" dirty="0" err="1"/>
@@ -4770,11 +4804,11 @@
           <a:p>
             <a:r>
               <a:rPr lang="en-US" dirty="0" err="1"/>
-              <a:t>rf_model</a:t>
+              <a:t>RandomForest</a:t>
             </a:r>
             <a:r>
               <a:rPr lang="en-US" dirty="0"/>
-              <a:t> = </a:t>
+              <a:t> : </a:t>
             </a:r>
             <a:r>
               <a:rPr lang="en-US" dirty="0" err="1"/>
@@ -4859,12 +4893,45 @@
           </a:p>
         </p:txBody>
       </p:sp>
+      <p:sp>
+        <p:nvSpPr>
+          <p:cNvPr id="10" name="Title 1">
+            <a:extLst>
+              <a:ext uri="{FF2B5EF4-FFF2-40B4-BE49-F238E27FC236}">
+                <a16:creationId xmlns:a16="http://schemas.microsoft.com/office/drawing/2014/main" id="{7A35668A-6F9A-E147-8527-BC129F43F977}"/>
+              </a:ext>
+            </a:extLst>
+          </p:cNvPr>
+          <p:cNvSpPr>
+            <a:spLocks noGrp="1"/>
+          </p:cNvSpPr>
+          <p:nvPr>
+            <p:ph type="title"/>
+          </p:nvPr>
+        </p:nvSpPr>
+        <p:spPr>
+          <a:xfrm>
+            <a:off x="1676400" y="365125"/>
+            <a:ext cx="10515600" cy="1325563"/>
+          </a:xfrm>
+        </p:spPr>
+        <p:txBody>
+          <a:bodyPr/>
+          <a:lstStyle/>
+          <a:p>
+            <a:r>
+              <a:rPr lang="en-US" dirty="0"/>
+              <a:t>Model Parameters</a:t>
+            </a:r>
+          </a:p>
+        </p:txBody>
+      </p:sp>
       <p:pic>
         <p:nvPicPr>
-          <p:cNvPr id="5" name="Content Placeholder 4">
-            <a:extLst>
-              <a:ext uri="{FF2B5EF4-FFF2-40B4-BE49-F238E27FC236}">
-                <a16:creationId xmlns:a16="http://schemas.microsoft.com/office/drawing/2014/main" id="{B141B2B0-8023-D543-9045-0B3B4106AF14}"/>
+          <p:cNvPr id="11" name="Content Placeholder 4">
+            <a:extLst>
+              <a:ext uri="{FF2B5EF4-FFF2-40B4-BE49-F238E27FC236}">
+                <a16:creationId xmlns:a16="http://schemas.microsoft.com/office/drawing/2014/main" id="{435F1D4A-C0BF-214B-A49A-DDF5473DAA82}"/>
               </a:ext>
             </a:extLst>
           </p:cNvPr>
@@ -4881,7 +4948,7 @@
         </p:blipFill>
         <p:spPr>
           <a:xfrm rot="5400000">
-            <a:off x="1491488" y="-1130511"/>
+            <a:off x="-892770" y="-1147763"/>
             <a:ext cx="682562" cy="4351338"/>
           </a:xfrm>
           <a:prstGeom prst="rect">
@@ -4891,10 +4958,10 @@
       </p:pic>
       <p:pic>
         <p:nvPicPr>
-          <p:cNvPr id="6" name="Content Placeholder 4">
-            <a:extLst>
-              <a:ext uri="{FF2B5EF4-FFF2-40B4-BE49-F238E27FC236}">
-                <a16:creationId xmlns:a16="http://schemas.microsoft.com/office/drawing/2014/main" id="{81D70639-DA9E-264D-AD02-D1AA79DE2130}"/>
+          <p:cNvPr id="12" name="Content Placeholder 4">
+            <a:extLst>
+              <a:ext uri="{FF2B5EF4-FFF2-40B4-BE49-F238E27FC236}">
+                <a16:creationId xmlns:a16="http://schemas.microsoft.com/office/drawing/2014/main" id="{08CB4F3D-F2C8-A342-94DF-3C245774B28A}"/>
               </a:ext>
             </a:extLst>
           </p:cNvPr>
@@ -4911,7 +4978,7 @@
         </p:blipFill>
         <p:spPr>
           <a:xfrm rot="5400000">
-            <a:off x="5842826" y="-1130511"/>
+            <a:off x="7836726" y="-1130511"/>
             <a:ext cx="682562" cy="4351338"/>
           </a:xfrm>
           <a:prstGeom prst="rect">
@@ -4921,10 +4988,10 @@
       </p:pic>
       <p:pic>
         <p:nvPicPr>
-          <p:cNvPr id="7" name="Content Placeholder 4">
-            <a:extLst>
-              <a:ext uri="{FF2B5EF4-FFF2-40B4-BE49-F238E27FC236}">
-                <a16:creationId xmlns:a16="http://schemas.microsoft.com/office/drawing/2014/main" id="{A7E6775A-0C14-984A-8882-AF794EB36612}"/>
+          <p:cNvPr id="13" name="Content Placeholder 4">
+            <a:extLst>
+              <a:ext uri="{FF2B5EF4-FFF2-40B4-BE49-F238E27FC236}">
+                <a16:creationId xmlns:a16="http://schemas.microsoft.com/office/drawing/2014/main" id="{66496816-B9E9-7D43-B5AC-BED33AE85AAF}"/>
               </a:ext>
             </a:extLst>
           </p:cNvPr>
@@ -4941,7 +5008,7 @@
         </p:blipFill>
         <p:spPr>
           <a:xfrm rot="5400000">
-            <a:off x="10194164" y="-1130509"/>
+            <a:off x="12188064" y="-1130509"/>
             <a:ext cx="682562" cy="4351338"/>
           </a:xfrm>
           <a:prstGeom prst="rect">
@@ -4982,99 +5049,12 @@
           <a:chExt cx="0" cy="0"/>
         </a:xfrm>
       </p:grpSpPr>
-      <p:pic>
-        <p:nvPicPr>
-          <p:cNvPr id="4" name="Picture 3">
-            <a:extLst>
-              <a:ext uri="{FF2B5EF4-FFF2-40B4-BE49-F238E27FC236}">
-                <a16:creationId xmlns:a16="http://schemas.microsoft.com/office/drawing/2014/main" id="{1BF37B36-3A69-0041-A981-B61ECFC5C90D}"/>
-              </a:ext>
-            </a:extLst>
-          </p:cNvPr>
-          <p:cNvPicPr>
-            <a:picLocks noChangeAspect="1"/>
-          </p:cNvPicPr>
-          <p:nvPr/>
-        </p:nvPicPr>
-        <p:blipFill rotWithShape="1">
-          <a:blip r:embed="rId2"/>
-          <a:srcRect l="16159" r="17400"/>
-          <a:stretch/>
-        </p:blipFill>
-        <p:spPr>
-          <a:xfrm>
-            <a:off x="4041271" y="1675025"/>
-            <a:ext cx="3978670" cy="3989175"/>
-          </a:xfrm>
-          <a:prstGeom prst="rect">
-            <a:avLst/>
-          </a:prstGeom>
-        </p:spPr>
-      </p:pic>
-      <p:pic>
-        <p:nvPicPr>
-          <p:cNvPr id="5" name="Picture 4">
-            <a:extLst>
-              <a:ext uri="{FF2B5EF4-FFF2-40B4-BE49-F238E27FC236}">
-                <a16:creationId xmlns:a16="http://schemas.microsoft.com/office/drawing/2014/main" id="{7A0D9134-F906-4646-BA73-D9DCA7C047E2}"/>
-              </a:ext>
-            </a:extLst>
-          </p:cNvPr>
-          <p:cNvPicPr>
-            <a:picLocks noChangeAspect="1"/>
-          </p:cNvPicPr>
-          <p:nvPr/>
-        </p:nvPicPr>
-        <p:blipFill rotWithShape="1">
-          <a:blip r:embed="rId3"/>
-          <a:srcRect l="16122" r="20338"/>
-          <a:stretch/>
-        </p:blipFill>
-        <p:spPr>
-          <a:xfrm>
-            <a:off x="185245" y="1675025"/>
-            <a:ext cx="3804998" cy="3989175"/>
-          </a:xfrm>
-          <a:prstGeom prst="rect">
-            <a:avLst/>
-          </a:prstGeom>
-        </p:spPr>
-      </p:pic>
-      <p:pic>
-        <p:nvPicPr>
-          <p:cNvPr id="6" name="Picture 5">
-            <a:extLst>
-              <a:ext uri="{FF2B5EF4-FFF2-40B4-BE49-F238E27FC236}">
-                <a16:creationId xmlns:a16="http://schemas.microsoft.com/office/drawing/2014/main" id="{CC9EB945-6C08-424D-B036-0B0A654CB809}"/>
-              </a:ext>
-            </a:extLst>
-          </p:cNvPr>
-          <p:cNvPicPr>
-            <a:picLocks noChangeAspect="1"/>
-          </p:cNvPicPr>
-          <p:nvPr/>
-        </p:nvPicPr>
-        <p:blipFill rotWithShape="1">
-          <a:blip r:embed="rId4"/>
-          <a:srcRect l="16669" r="19264"/>
-          <a:stretch/>
-        </p:blipFill>
-        <p:spPr>
-          <a:xfrm>
-            <a:off x="7896612" y="1675025"/>
-            <a:ext cx="3836575" cy="3989175"/>
-          </a:xfrm>
-          <a:prstGeom prst="rect">
-            <a:avLst/>
-          </a:prstGeom>
-        </p:spPr>
-      </p:pic>
-      <p:sp>
-        <p:nvSpPr>
-          <p:cNvPr id="7" name="Slide Number Placeholder 6">
-            <a:extLst>
-              <a:ext uri="{FF2B5EF4-FFF2-40B4-BE49-F238E27FC236}">
-                <a16:creationId xmlns:a16="http://schemas.microsoft.com/office/drawing/2014/main" id="{6FBE9790-84CD-B442-A54F-7885A6B7D15C}"/>
+      <p:sp>
+        <p:nvSpPr>
+          <p:cNvPr id="4" name="Slide Number Placeholder 3">
+            <a:extLst>
+              <a:ext uri="{FF2B5EF4-FFF2-40B4-BE49-F238E27FC236}">
+                <a16:creationId xmlns:a16="http://schemas.microsoft.com/office/drawing/2014/main" id="{3498DC85-F018-664A-8E44-35A1E70994ED}"/>
               </a:ext>
             </a:extLst>
           </p:cNvPr>
@@ -5100,10 +5080,10 @@
       </p:sp>
       <p:pic>
         <p:nvPicPr>
-          <p:cNvPr id="8" name="Content Placeholder 4">
-            <a:extLst>
-              <a:ext uri="{FF2B5EF4-FFF2-40B4-BE49-F238E27FC236}">
-                <a16:creationId xmlns:a16="http://schemas.microsoft.com/office/drawing/2014/main" id="{14D4DDF7-7579-0247-B761-899EC4AD2831}"/>
+          <p:cNvPr id="9" name="Picture 8">
+            <a:extLst>
+              <a:ext uri="{FF2B5EF4-FFF2-40B4-BE49-F238E27FC236}">
+                <a16:creationId xmlns:a16="http://schemas.microsoft.com/office/drawing/2014/main" id="{F759B69E-7B3A-454C-805B-7CB5413AA188}"/>
               </a:ext>
             </a:extLst>
           </p:cNvPr>
@@ -5113,15 +5093,15 @@
           <p:nvPr/>
         </p:nvPicPr>
         <p:blipFill>
-          <a:blip r:embed="rId5"/>
+          <a:blip r:embed="rId2"/>
           <a:stretch>
             <a:fillRect/>
           </a:stretch>
         </p:blipFill>
         <p:spPr>
-          <a:xfrm rot="5400000">
-            <a:off x="1491488" y="-1135063"/>
-            <a:ext cx="682562" cy="4351338"/>
+          <a:xfrm>
+            <a:off x="900907" y="2253731"/>
+            <a:ext cx="5105400" cy="3403600"/>
           </a:xfrm>
           <a:prstGeom prst="rect">
             <a:avLst/>
@@ -5130,10 +5110,10 @@
       </p:pic>
       <p:pic>
         <p:nvPicPr>
-          <p:cNvPr id="9" name="Content Placeholder 4">
-            <a:extLst>
-              <a:ext uri="{FF2B5EF4-FFF2-40B4-BE49-F238E27FC236}">
-                <a16:creationId xmlns:a16="http://schemas.microsoft.com/office/drawing/2014/main" id="{1392F29F-4C01-DE4F-A72E-8D4D5441A79E}"/>
+          <p:cNvPr id="11" name="Picture 10">
+            <a:extLst>
+              <a:ext uri="{FF2B5EF4-FFF2-40B4-BE49-F238E27FC236}">
+                <a16:creationId xmlns:a16="http://schemas.microsoft.com/office/drawing/2014/main" id="{637E4D6E-2B2B-7340-A90F-1F95C867F7FB}"/>
               </a:ext>
             </a:extLst>
           </p:cNvPr>
@@ -5143,27 +5123,60 @@
           <p:nvPr/>
         </p:nvPicPr>
         <p:blipFill>
-          <a:blip r:embed="rId5"/>
+          <a:blip r:embed="rId3"/>
           <a:stretch>
             <a:fillRect/>
           </a:stretch>
         </p:blipFill>
         <p:spPr>
-          <a:xfrm rot="5400000">
-            <a:off x="5842826" y="-1130511"/>
-            <a:ext cx="682562" cy="4351338"/>
+          <a:xfrm>
+            <a:off x="6184107" y="2253731"/>
+            <a:ext cx="5105400" cy="3403600"/>
           </a:xfrm>
           <a:prstGeom prst="rect">
             <a:avLst/>
           </a:prstGeom>
         </p:spPr>
       </p:pic>
+      <p:sp>
+        <p:nvSpPr>
+          <p:cNvPr id="12" name="Title 1">
+            <a:extLst>
+              <a:ext uri="{FF2B5EF4-FFF2-40B4-BE49-F238E27FC236}">
+                <a16:creationId xmlns:a16="http://schemas.microsoft.com/office/drawing/2014/main" id="{BC42285B-840A-2046-9125-DB0C06645086}"/>
+              </a:ext>
+            </a:extLst>
+          </p:cNvPr>
+          <p:cNvSpPr>
+            <a:spLocks noGrp="1"/>
+          </p:cNvSpPr>
+          <p:nvPr>
+            <p:ph type="title"/>
+          </p:nvPr>
+        </p:nvSpPr>
+        <p:spPr>
+          <a:xfrm>
+            <a:off x="1676400" y="365125"/>
+            <a:ext cx="10515600" cy="1325563"/>
+          </a:xfrm>
+        </p:spPr>
+        <p:txBody>
+          <a:bodyPr/>
+          <a:lstStyle/>
+          <a:p>
+            <a:r>
+              <a:rPr lang="en-US" dirty="0"/>
+              <a:t>Some EDA</a:t>
+            </a:r>
+          </a:p>
+        </p:txBody>
+      </p:sp>
       <p:pic>
         <p:nvPicPr>
-          <p:cNvPr id="10" name="Content Placeholder 4">
-            <a:extLst>
-              <a:ext uri="{FF2B5EF4-FFF2-40B4-BE49-F238E27FC236}">
-                <a16:creationId xmlns:a16="http://schemas.microsoft.com/office/drawing/2014/main" id="{B3993A3A-07AA-5041-A33C-989A43FC1ADA}"/>
+          <p:cNvPr id="13" name="Content Placeholder 4">
+            <a:extLst>
+              <a:ext uri="{FF2B5EF4-FFF2-40B4-BE49-F238E27FC236}">
+                <a16:creationId xmlns:a16="http://schemas.microsoft.com/office/drawing/2014/main" id="{1CA21A37-F637-0A44-AD89-DF7F7ACA4C39}"/>
               </a:ext>
             </a:extLst>
           </p:cNvPr>
@@ -5173,14 +5186,74 @@
           <p:nvPr/>
         </p:nvPicPr>
         <p:blipFill>
-          <a:blip r:embed="rId5"/>
+          <a:blip r:embed="rId4"/>
           <a:stretch>
             <a:fillRect/>
           </a:stretch>
         </p:blipFill>
         <p:spPr>
           <a:xfrm rot="5400000">
-            <a:off x="10194164" y="-1130509"/>
+            <a:off x="-892770" y="-1147763"/>
+            <a:ext cx="682562" cy="4351338"/>
+          </a:xfrm>
+          <a:prstGeom prst="rect">
+            <a:avLst/>
+          </a:prstGeom>
+        </p:spPr>
+      </p:pic>
+      <p:pic>
+        <p:nvPicPr>
+          <p:cNvPr id="14" name="Content Placeholder 4">
+            <a:extLst>
+              <a:ext uri="{FF2B5EF4-FFF2-40B4-BE49-F238E27FC236}">
+                <a16:creationId xmlns:a16="http://schemas.microsoft.com/office/drawing/2014/main" id="{DBDAD956-D499-E243-BACE-995A359723D8}"/>
+              </a:ext>
+            </a:extLst>
+          </p:cNvPr>
+          <p:cNvPicPr>
+            <a:picLocks noChangeAspect="1"/>
+          </p:cNvPicPr>
+          <p:nvPr/>
+        </p:nvPicPr>
+        <p:blipFill>
+          <a:blip r:embed="rId4"/>
+          <a:stretch>
+            <a:fillRect/>
+          </a:stretch>
+        </p:blipFill>
+        <p:spPr>
+          <a:xfrm rot="5400000">
+            <a:off x="6046026" y="-1130511"/>
+            <a:ext cx="682562" cy="4351338"/>
+          </a:xfrm>
+          <a:prstGeom prst="rect">
+            <a:avLst/>
+          </a:prstGeom>
+        </p:spPr>
+      </p:pic>
+      <p:pic>
+        <p:nvPicPr>
+          <p:cNvPr id="15" name="Content Placeholder 4">
+            <a:extLst>
+              <a:ext uri="{FF2B5EF4-FFF2-40B4-BE49-F238E27FC236}">
+                <a16:creationId xmlns:a16="http://schemas.microsoft.com/office/drawing/2014/main" id="{2C6DCE0A-B15D-5C4A-BD74-939924FE4A17}"/>
+              </a:ext>
+            </a:extLst>
+          </p:cNvPr>
+          <p:cNvPicPr>
+            <a:picLocks noChangeAspect="1"/>
+          </p:cNvPicPr>
+          <p:nvPr/>
+        </p:nvPicPr>
+        <p:blipFill>
+          <a:blip r:embed="rId4"/>
+          <a:stretch>
+            <a:fillRect/>
+          </a:stretch>
+        </p:blipFill>
+        <p:spPr>
+          <a:xfrm rot="5400000">
+            <a:off x="10397364" y="-1130509"/>
             <a:ext cx="682562" cy="4351338"/>
           </a:xfrm>
           <a:prstGeom prst="rect">
@@ -5191,7 +5264,7 @@
     </p:spTree>
     <p:extLst>
       <p:ext uri="{BB962C8B-B14F-4D97-AF65-F5344CB8AC3E}">
-        <p14:creationId xmlns:p14="http://schemas.microsoft.com/office/powerpoint/2010/main" val="2679827541"/>
+        <p14:creationId xmlns:p14="http://schemas.microsoft.com/office/powerpoint/2010/main" val="2785134830"/>
       </p:ext>
     </p:extLst>
   </p:cSld>
@@ -5226,7 +5299,156 @@
           <p:cNvPr id="4" name="Picture 3">
             <a:extLst>
               <a:ext uri="{FF2B5EF4-FFF2-40B4-BE49-F238E27FC236}">
-                <a16:creationId xmlns:a16="http://schemas.microsoft.com/office/drawing/2014/main" id="{F0D79E4A-A490-0344-8655-7C7A1166BE90}"/>
+                <a16:creationId xmlns:a16="http://schemas.microsoft.com/office/drawing/2014/main" id="{1BF37B36-3A69-0041-A981-B61ECFC5C90D}"/>
+              </a:ext>
+            </a:extLst>
+          </p:cNvPr>
+          <p:cNvPicPr>
+            <a:picLocks noChangeAspect="1"/>
+          </p:cNvPicPr>
+          <p:nvPr/>
+        </p:nvPicPr>
+        <p:blipFill rotWithShape="1">
+          <a:blip r:embed="rId2"/>
+          <a:srcRect l="16159" r="17400"/>
+          <a:stretch/>
+        </p:blipFill>
+        <p:spPr>
+          <a:xfrm>
+            <a:off x="4041271" y="1675025"/>
+            <a:ext cx="3978670" cy="3989175"/>
+          </a:xfrm>
+          <a:prstGeom prst="rect">
+            <a:avLst/>
+          </a:prstGeom>
+        </p:spPr>
+      </p:pic>
+      <p:pic>
+        <p:nvPicPr>
+          <p:cNvPr id="5" name="Picture 4">
+            <a:extLst>
+              <a:ext uri="{FF2B5EF4-FFF2-40B4-BE49-F238E27FC236}">
+                <a16:creationId xmlns:a16="http://schemas.microsoft.com/office/drawing/2014/main" id="{7A0D9134-F906-4646-BA73-D9DCA7C047E2}"/>
+              </a:ext>
+            </a:extLst>
+          </p:cNvPr>
+          <p:cNvPicPr>
+            <a:picLocks noChangeAspect="1"/>
+          </p:cNvPicPr>
+          <p:nvPr/>
+        </p:nvPicPr>
+        <p:blipFill rotWithShape="1">
+          <a:blip r:embed="rId3"/>
+          <a:srcRect l="16122" r="20338"/>
+          <a:stretch/>
+        </p:blipFill>
+        <p:spPr>
+          <a:xfrm>
+            <a:off x="185245" y="1675025"/>
+            <a:ext cx="3804998" cy="3989175"/>
+          </a:xfrm>
+          <a:prstGeom prst="rect">
+            <a:avLst/>
+          </a:prstGeom>
+        </p:spPr>
+      </p:pic>
+      <p:pic>
+        <p:nvPicPr>
+          <p:cNvPr id="6" name="Picture 5">
+            <a:extLst>
+              <a:ext uri="{FF2B5EF4-FFF2-40B4-BE49-F238E27FC236}">
+                <a16:creationId xmlns:a16="http://schemas.microsoft.com/office/drawing/2014/main" id="{CC9EB945-6C08-424D-B036-0B0A654CB809}"/>
+              </a:ext>
+            </a:extLst>
+          </p:cNvPr>
+          <p:cNvPicPr>
+            <a:picLocks noChangeAspect="1"/>
+          </p:cNvPicPr>
+          <p:nvPr/>
+        </p:nvPicPr>
+        <p:blipFill rotWithShape="1">
+          <a:blip r:embed="rId4"/>
+          <a:srcRect l="16669" r="19264"/>
+          <a:stretch/>
+        </p:blipFill>
+        <p:spPr>
+          <a:xfrm>
+            <a:off x="7896612" y="1675025"/>
+            <a:ext cx="3836575" cy="3989175"/>
+          </a:xfrm>
+          <a:prstGeom prst="rect">
+            <a:avLst/>
+          </a:prstGeom>
+        </p:spPr>
+      </p:pic>
+      <p:sp>
+        <p:nvSpPr>
+          <p:cNvPr id="7" name="Slide Number Placeholder 6">
+            <a:extLst>
+              <a:ext uri="{FF2B5EF4-FFF2-40B4-BE49-F238E27FC236}">
+                <a16:creationId xmlns:a16="http://schemas.microsoft.com/office/drawing/2014/main" id="{6FBE9790-84CD-B442-A54F-7885A6B7D15C}"/>
+              </a:ext>
+            </a:extLst>
+          </p:cNvPr>
+          <p:cNvSpPr>
+            <a:spLocks noGrp="1"/>
+          </p:cNvSpPr>
+          <p:nvPr>
+            <p:ph type="sldNum" sz="quarter" idx="12"/>
+          </p:nvPr>
+        </p:nvSpPr>
+        <p:spPr/>
+        <p:txBody>
+          <a:bodyPr/>
+          <a:lstStyle/>
+          <a:p>
+            <a:fld id="{052702CF-B793-8841-9D68-A44C3863FEDD}" type="slidenum">
+              <a:rPr lang="en-US" smtClean="0"/>
+              <a:t>15</a:t>
+            </a:fld>
+            <a:endParaRPr lang="en-US"/>
+          </a:p>
+        </p:txBody>
+      </p:sp>
+      <p:sp>
+        <p:nvSpPr>
+          <p:cNvPr id="11" name="Title 1">
+            <a:extLst>
+              <a:ext uri="{FF2B5EF4-FFF2-40B4-BE49-F238E27FC236}">
+                <a16:creationId xmlns:a16="http://schemas.microsoft.com/office/drawing/2014/main" id="{76218228-4328-C44E-BB83-E3ECDE1D69C0}"/>
+              </a:ext>
+            </a:extLst>
+          </p:cNvPr>
+          <p:cNvSpPr>
+            <a:spLocks noGrp="1"/>
+          </p:cNvSpPr>
+          <p:nvPr>
+            <p:ph type="title"/>
+          </p:nvPr>
+        </p:nvSpPr>
+        <p:spPr>
+          <a:xfrm>
+            <a:off x="1676400" y="365125"/>
+            <a:ext cx="10515600" cy="1325563"/>
+          </a:xfrm>
+        </p:spPr>
+        <p:txBody>
+          <a:bodyPr/>
+          <a:lstStyle/>
+          <a:p>
+            <a:r>
+              <a:rPr lang="en-US" dirty="0"/>
+              <a:t>ROC Curves on Train Data</a:t>
+            </a:r>
+          </a:p>
+        </p:txBody>
+      </p:sp>
+      <p:pic>
+        <p:nvPicPr>
+          <p:cNvPr id="12" name="Content Placeholder 4">
+            <a:extLst>
+              <a:ext uri="{FF2B5EF4-FFF2-40B4-BE49-F238E27FC236}">
+                <a16:creationId xmlns:a16="http://schemas.microsoft.com/office/drawing/2014/main" id="{276CE286-F9AB-6B46-906D-D320EB752944}"/>
               </a:ext>
             </a:extLst>
           </p:cNvPr>
@@ -5236,15 +5458,15 @@
           <p:nvPr/>
         </p:nvPicPr>
         <p:blipFill>
-          <a:blip r:embed="rId2"/>
+          <a:blip r:embed="rId5"/>
           <a:stretch>
             <a:fillRect/>
           </a:stretch>
         </p:blipFill>
         <p:spPr>
-          <a:xfrm>
-            <a:off x="5717400" y="1417104"/>
-            <a:ext cx="6474600" cy="4313064"/>
+          <a:xfrm rot="5400000">
+            <a:off x="-892770" y="-1147763"/>
+            <a:ext cx="682562" cy="4351338"/>
           </a:xfrm>
           <a:prstGeom prst="rect">
             <a:avLst/>
@@ -5253,10 +5475,10 @@
       </p:pic>
       <p:pic>
         <p:nvPicPr>
-          <p:cNvPr id="5" name="Picture 4">
-            <a:extLst>
-              <a:ext uri="{FF2B5EF4-FFF2-40B4-BE49-F238E27FC236}">
-                <a16:creationId xmlns:a16="http://schemas.microsoft.com/office/drawing/2014/main" id="{78B0501D-F79C-CA45-85BA-BA8C95C2D514}"/>
+          <p:cNvPr id="13" name="Content Placeholder 4">
+            <a:extLst>
+              <a:ext uri="{FF2B5EF4-FFF2-40B4-BE49-F238E27FC236}">
+                <a16:creationId xmlns:a16="http://schemas.microsoft.com/office/drawing/2014/main" id="{50A1318F-E182-EF46-ADA2-B80D0FF36C88}"/>
               </a:ext>
             </a:extLst>
           </p:cNvPr>
@@ -5266,56 +5488,27 @@
           <p:nvPr/>
         </p:nvPicPr>
         <p:blipFill>
-          <a:blip r:embed="rId3"/>
+          <a:blip r:embed="rId5"/>
           <a:stretch>
             <a:fillRect/>
           </a:stretch>
         </p:blipFill>
         <p:spPr>
-          <a:xfrm>
-            <a:off x="0" y="1417104"/>
-            <a:ext cx="6474600" cy="4313064"/>
+          <a:xfrm rot="5400000">
+            <a:off x="9411526" y="-1130511"/>
+            <a:ext cx="682562" cy="4351338"/>
           </a:xfrm>
           <a:prstGeom prst="rect">
             <a:avLst/>
           </a:prstGeom>
         </p:spPr>
       </p:pic>
-      <p:sp>
-        <p:nvSpPr>
-          <p:cNvPr id="6" name="Slide Number Placeholder 5">
-            <a:extLst>
-              <a:ext uri="{FF2B5EF4-FFF2-40B4-BE49-F238E27FC236}">
-                <a16:creationId xmlns:a16="http://schemas.microsoft.com/office/drawing/2014/main" id="{2FD45FB8-C758-5049-B68B-F01586433F27}"/>
-              </a:ext>
-            </a:extLst>
-          </p:cNvPr>
-          <p:cNvSpPr>
-            <a:spLocks noGrp="1"/>
-          </p:cNvSpPr>
-          <p:nvPr>
-            <p:ph type="sldNum" sz="quarter" idx="12"/>
-          </p:nvPr>
-        </p:nvSpPr>
-        <p:spPr/>
-        <p:txBody>
-          <a:bodyPr/>
-          <a:lstStyle/>
-          <a:p>
-            <a:fld id="{052702CF-B793-8841-9D68-A44C3863FEDD}" type="slidenum">
-              <a:rPr lang="en-US" smtClean="0"/>
-              <a:t>15</a:t>
-            </a:fld>
-            <a:endParaRPr lang="en-US"/>
-          </a:p>
-        </p:txBody>
-      </p:sp>
       <p:pic>
         <p:nvPicPr>
-          <p:cNvPr id="7" name="Content Placeholder 4">
-            <a:extLst>
-              <a:ext uri="{FF2B5EF4-FFF2-40B4-BE49-F238E27FC236}">
-                <a16:creationId xmlns:a16="http://schemas.microsoft.com/office/drawing/2014/main" id="{C37280F3-2302-2C4D-8D16-0F24158CD823}"/>
+          <p:cNvPr id="14" name="Content Placeholder 4">
+            <a:extLst>
+              <a:ext uri="{FF2B5EF4-FFF2-40B4-BE49-F238E27FC236}">
+                <a16:creationId xmlns:a16="http://schemas.microsoft.com/office/drawing/2014/main" id="{1D6B0550-1807-9041-BB1D-06D9B31DA7A0}"/>
               </a:ext>
             </a:extLst>
           </p:cNvPr>
@@ -5325,74 +5518,14 @@
           <p:nvPr/>
         </p:nvPicPr>
         <p:blipFill>
-          <a:blip r:embed="rId4"/>
+          <a:blip r:embed="rId5"/>
           <a:stretch>
             <a:fillRect/>
           </a:stretch>
         </p:blipFill>
         <p:spPr>
           <a:xfrm rot="5400000">
-            <a:off x="1491488" y="-1135063"/>
-            <a:ext cx="682562" cy="4351338"/>
-          </a:xfrm>
-          <a:prstGeom prst="rect">
-            <a:avLst/>
-          </a:prstGeom>
-        </p:spPr>
-      </p:pic>
-      <p:pic>
-        <p:nvPicPr>
-          <p:cNvPr id="8" name="Content Placeholder 4">
-            <a:extLst>
-              <a:ext uri="{FF2B5EF4-FFF2-40B4-BE49-F238E27FC236}">
-                <a16:creationId xmlns:a16="http://schemas.microsoft.com/office/drawing/2014/main" id="{26481FEE-D912-974C-820C-8ED32AAAA58C}"/>
-              </a:ext>
-            </a:extLst>
-          </p:cNvPr>
-          <p:cNvPicPr>
-            <a:picLocks noChangeAspect="1"/>
-          </p:cNvPicPr>
-          <p:nvPr/>
-        </p:nvPicPr>
-        <p:blipFill>
-          <a:blip r:embed="rId4"/>
-          <a:stretch>
-            <a:fillRect/>
-          </a:stretch>
-        </p:blipFill>
-        <p:spPr>
-          <a:xfrm rot="5400000">
-            <a:off x="5842826" y="-1130511"/>
-            <a:ext cx="682562" cy="4351338"/>
-          </a:xfrm>
-          <a:prstGeom prst="rect">
-            <a:avLst/>
-          </a:prstGeom>
-        </p:spPr>
-      </p:pic>
-      <p:pic>
-        <p:nvPicPr>
-          <p:cNvPr id="9" name="Content Placeholder 4">
-            <a:extLst>
-              <a:ext uri="{FF2B5EF4-FFF2-40B4-BE49-F238E27FC236}">
-                <a16:creationId xmlns:a16="http://schemas.microsoft.com/office/drawing/2014/main" id="{898AD83E-A2C9-9342-AAF1-2269D38F885D}"/>
-              </a:ext>
-            </a:extLst>
-          </p:cNvPr>
-          <p:cNvPicPr>
-            <a:picLocks noChangeAspect="1"/>
-          </p:cNvPicPr>
-          <p:nvPr/>
-        </p:nvPicPr>
-        <p:blipFill>
-          <a:blip r:embed="rId4"/>
-          <a:stretch>
-            <a:fillRect/>
-          </a:stretch>
-        </p:blipFill>
-        <p:spPr>
-          <a:xfrm rot="5400000">
-            <a:off x="10194164" y="-1130509"/>
+            <a:off x="13762864" y="-1130509"/>
             <a:ext cx="682562" cy="4351338"/>
           </a:xfrm>
           <a:prstGeom prst="rect">
@@ -5403,7 +5536,7 @@
     </p:spTree>
     <p:extLst>
       <p:ext uri="{BB962C8B-B14F-4D97-AF65-F5344CB8AC3E}">
-        <p14:creationId xmlns:p14="http://schemas.microsoft.com/office/powerpoint/2010/main" val="1555569198"/>
+        <p14:creationId xmlns:p14="http://schemas.microsoft.com/office/powerpoint/2010/main" val="2679827541"/>
       </p:ext>
     </p:extLst>
   </p:cSld>
@@ -5435,10 +5568,10 @@
       </p:grpSpPr>
       <p:pic>
         <p:nvPicPr>
-          <p:cNvPr id="2" name="Picture 1">
-            <a:extLst>
-              <a:ext uri="{FF2B5EF4-FFF2-40B4-BE49-F238E27FC236}">
-                <a16:creationId xmlns:a16="http://schemas.microsoft.com/office/drawing/2014/main" id="{618DADE1-B9A7-7341-B92B-D5DE28B5079F}"/>
+          <p:cNvPr id="4" name="Picture 3">
+            <a:extLst>
+              <a:ext uri="{FF2B5EF4-FFF2-40B4-BE49-F238E27FC236}">
+                <a16:creationId xmlns:a16="http://schemas.microsoft.com/office/drawing/2014/main" id="{F0D79E4A-A490-0344-8655-7C7A1166BE90}"/>
               </a:ext>
             </a:extLst>
           </p:cNvPr>
@@ -5455,49 +5588,20 @@
         </p:blipFill>
         <p:spPr>
           <a:xfrm>
-            <a:off x="3025184" y="1776413"/>
-            <a:ext cx="5935265" cy="4748212"/>
+            <a:off x="5717400" y="1417104"/>
+            <a:ext cx="6474600" cy="4313064"/>
           </a:xfrm>
           <a:prstGeom prst="rect">
             <a:avLst/>
           </a:prstGeom>
         </p:spPr>
       </p:pic>
-      <p:sp>
-        <p:nvSpPr>
-          <p:cNvPr id="3" name="Slide Number Placeholder 2">
-            <a:extLst>
-              <a:ext uri="{FF2B5EF4-FFF2-40B4-BE49-F238E27FC236}">
-                <a16:creationId xmlns:a16="http://schemas.microsoft.com/office/drawing/2014/main" id="{6097BB79-C9AA-F74E-9053-0D4BB5866039}"/>
-              </a:ext>
-            </a:extLst>
-          </p:cNvPr>
-          <p:cNvSpPr>
-            <a:spLocks noGrp="1"/>
-          </p:cNvSpPr>
-          <p:nvPr>
-            <p:ph type="sldNum" sz="quarter" idx="12"/>
-          </p:nvPr>
-        </p:nvSpPr>
-        <p:spPr/>
-        <p:txBody>
-          <a:bodyPr/>
-          <a:lstStyle/>
-          <a:p>
-            <a:fld id="{052702CF-B793-8841-9D68-A44C3863FEDD}" type="slidenum">
-              <a:rPr lang="en-US" smtClean="0"/>
-              <a:t>16</a:t>
-            </a:fld>
-            <a:endParaRPr lang="en-US"/>
-          </a:p>
-        </p:txBody>
-      </p:sp>
       <p:pic>
         <p:nvPicPr>
-          <p:cNvPr id="4" name="Content Placeholder 4">
-            <a:extLst>
-              <a:ext uri="{FF2B5EF4-FFF2-40B4-BE49-F238E27FC236}">
-                <a16:creationId xmlns:a16="http://schemas.microsoft.com/office/drawing/2014/main" id="{330A53D5-57C5-ED47-BA3E-81333BB43C31}"/>
+          <p:cNvPr id="5" name="Picture 4">
+            <a:extLst>
+              <a:ext uri="{FF2B5EF4-FFF2-40B4-BE49-F238E27FC236}">
+                <a16:creationId xmlns:a16="http://schemas.microsoft.com/office/drawing/2014/main" id="{78B0501D-F79C-CA45-85BA-BA8C95C2D514}"/>
               </a:ext>
             </a:extLst>
           </p:cNvPr>
@@ -5513,21 +5617,83 @@
           </a:stretch>
         </p:blipFill>
         <p:spPr>
-          <a:xfrm rot="5400000">
-            <a:off x="1491488" y="-1135063"/>
-            <a:ext cx="682562" cy="4351338"/>
+          <a:xfrm>
+            <a:off x="0" y="1417104"/>
+            <a:ext cx="6474600" cy="4313064"/>
           </a:xfrm>
           <a:prstGeom prst="rect">
             <a:avLst/>
           </a:prstGeom>
         </p:spPr>
       </p:pic>
+      <p:sp>
+        <p:nvSpPr>
+          <p:cNvPr id="6" name="Slide Number Placeholder 5">
+            <a:extLst>
+              <a:ext uri="{FF2B5EF4-FFF2-40B4-BE49-F238E27FC236}">
+                <a16:creationId xmlns:a16="http://schemas.microsoft.com/office/drawing/2014/main" id="{2FD45FB8-C758-5049-B68B-F01586433F27}"/>
+              </a:ext>
+            </a:extLst>
+          </p:cNvPr>
+          <p:cNvSpPr>
+            <a:spLocks noGrp="1"/>
+          </p:cNvSpPr>
+          <p:nvPr>
+            <p:ph type="sldNum" sz="quarter" idx="12"/>
+          </p:nvPr>
+        </p:nvSpPr>
+        <p:spPr/>
+        <p:txBody>
+          <a:bodyPr/>
+          <a:lstStyle/>
+          <a:p>
+            <a:fld id="{052702CF-B793-8841-9D68-A44C3863FEDD}" type="slidenum">
+              <a:rPr lang="en-US" smtClean="0"/>
+              <a:t>16</a:t>
+            </a:fld>
+            <a:endParaRPr lang="en-US"/>
+          </a:p>
+        </p:txBody>
+      </p:sp>
+      <p:sp>
+        <p:nvSpPr>
+          <p:cNvPr id="10" name="Title 1">
+            <a:extLst>
+              <a:ext uri="{FF2B5EF4-FFF2-40B4-BE49-F238E27FC236}">
+                <a16:creationId xmlns:a16="http://schemas.microsoft.com/office/drawing/2014/main" id="{A4DAA689-28E5-984F-9AD2-AF8E05B2FA9C}"/>
+              </a:ext>
+            </a:extLst>
+          </p:cNvPr>
+          <p:cNvSpPr>
+            <a:spLocks noGrp="1"/>
+          </p:cNvSpPr>
+          <p:nvPr>
+            <p:ph type="title"/>
+          </p:nvPr>
+        </p:nvSpPr>
+        <p:spPr>
+          <a:xfrm>
+            <a:off x="1676400" y="365125"/>
+            <a:ext cx="10515600" cy="1325563"/>
+          </a:xfrm>
+        </p:spPr>
+        <p:txBody>
+          <a:bodyPr/>
+          <a:lstStyle/>
+          <a:p>
+            <a:r>
+              <a:rPr lang="en-US" dirty="0"/>
+              <a:t>Other Precision and Recall Curves</a:t>
+            </a:r>
+          </a:p>
+        </p:txBody>
+      </p:sp>
       <p:pic>
         <p:nvPicPr>
-          <p:cNvPr id="5" name="Content Placeholder 4">
-            <a:extLst>
-              <a:ext uri="{FF2B5EF4-FFF2-40B4-BE49-F238E27FC236}">
-                <a16:creationId xmlns:a16="http://schemas.microsoft.com/office/drawing/2014/main" id="{8CE44E0F-FF5F-7847-ABE2-F846E28B0E1C}"/>
+          <p:cNvPr id="11" name="Content Placeholder 4">
+            <a:extLst>
+              <a:ext uri="{FF2B5EF4-FFF2-40B4-BE49-F238E27FC236}">
+                <a16:creationId xmlns:a16="http://schemas.microsoft.com/office/drawing/2014/main" id="{613F2D3F-32F6-0144-AEC5-6AB8572D956D}"/>
               </a:ext>
             </a:extLst>
           </p:cNvPr>
@@ -5537,14 +5703,14 @@
           <p:nvPr/>
         </p:nvPicPr>
         <p:blipFill>
-          <a:blip r:embed="rId3"/>
+          <a:blip r:embed="rId4"/>
           <a:stretch>
             <a:fillRect/>
           </a:stretch>
         </p:blipFill>
         <p:spPr>
           <a:xfrm rot="5400000">
-            <a:off x="5842826" y="-1130511"/>
+            <a:off x="-892770" y="-1147763"/>
             <a:ext cx="682562" cy="4351338"/>
           </a:xfrm>
           <a:prstGeom prst="rect">
@@ -5554,10 +5720,10 @@
       </p:pic>
       <p:pic>
         <p:nvPicPr>
-          <p:cNvPr id="6" name="Content Placeholder 4">
-            <a:extLst>
-              <a:ext uri="{FF2B5EF4-FFF2-40B4-BE49-F238E27FC236}">
-                <a16:creationId xmlns:a16="http://schemas.microsoft.com/office/drawing/2014/main" id="{6BE92B8C-B9B8-194E-9C17-95ABB00ED6AB}"/>
+          <p:cNvPr id="13" name="Content Placeholder 4">
+            <a:extLst>
+              <a:ext uri="{FF2B5EF4-FFF2-40B4-BE49-F238E27FC236}">
+                <a16:creationId xmlns:a16="http://schemas.microsoft.com/office/drawing/2014/main" id="{F661AA43-A865-D641-A219-CD006EC67569}"/>
               </a:ext>
             </a:extLst>
           </p:cNvPr>
@@ -5567,14 +5733,14 @@
           <p:nvPr/>
         </p:nvPicPr>
         <p:blipFill>
-          <a:blip r:embed="rId3"/>
+          <a:blip r:embed="rId4"/>
           <a:stretch>
             <a:fillRect/>
           </a:stretch>
         </p:blipFill>
         <p:spPr>
           <a:xfrm rot="5400000">
-            <a:off x="10194164" y="-1130509"/>
+            <a:off x="11260964" y="-1130509"/>
             <a:ext cx="682562" cy="4351338"/>
           </a:xfrm>
           <a:prstGeom prst="rect">
@@ -5585,7 +5751,7 @@
     </p:spTree>
     <p:extLst>
       <p:ext uri="{BB962C8B-B14F-4D97-AF65-F5344CB8AC3E}">
-        <p14:creationId xmlns:p14="http://schemas.microsoft.com/office/powerpoint/2010/main" val="4052448103"/>
+        <p14:creationId xmlns:p14="http://schemas.microsoft.com/office/powerpoint/2010/main" val="1555569198"/>
       </p:ext>
     </p:extLst>
   </p:cSld>
@@ -5620,7 +5786,7 @@
           <p:cNvPr id="2" name="Picture 1">
             <a:extLst>
               <a:ext uri="{FF2B5EF4-FFF2-40B4-BE49-F238E27FC236}">
-                <a16:creationId xmlns:a16="http://schemas.microsoft.com/office/drawing/2014/main" id="{B0D9EFFE-612C-0742-AC23-84668EDD7F01}"/>
+                <a16:creationId xmlns:a16="http://schemas.microsoft.com/office/drawing/2014/main" id="{618DADE1-B9A7-7341-B92B-D5DE28B5079F}"/>
               </a:ext>
             </a:extLst>
           </p:cNvPr>
@@ -5637,20 +5803,91 @@
         </p:blipFill>
         <p:spPr>
           <a:xfrm>
-            <a:off x="6330100" y="3556350"/>
-            <a:ext cx="4762500" cy="3175000"/>
+            <a:off x="3025184" y="1776413"/>
+            <a:ext cx="5935265" cy="4748212"/>
           </a:xfrm>
           <a:prstGeom prst="rect">
             <a:avLst/>
           </a:prstGeom>
         </p:spPr>
       </p:pic>
+      <p:sp>
+        <p:nvSpPr>
+          <p:cNvPr id="3" name="Slide Number Placeholder 2">
+            <a:extLst>
+              <a:ext uri="{FF2B5EF4-FFF2-40B4-BE49-F238E27FC236}">
+                <a16:creationId xmlns:a16="http://schemas.microsoft.com/office/drawing/2014/main" id="{6097BB79-C9AA-F74E-9053-0D4BB5866039}"/>
+              </a:ext>
+            </a:extLst>
+          </p:cNvPr>
+          <p:cNvSpPr>
+            <a:spLocks noGrp="1"/>
+          </p:cNvSpPr>
+          <p:nvPr>
+            <p:ph type="sldNum" sz="quarter" idx="12"/>
+          </p:nvPr>
+        </p:nvSpPr>
+        <p:spPr/>
+        <p:txBody>
+          <a:bodyPr/>
+          <a:lstStyle/>
+          <a:p>
+            <a:fld id="{052702CF-B793-8841-9D68-A44C3863FEDD}" type="slidenum">
+              <a:rPr lang="en-US" smtClean="0"/>
+              <a:t>17</a:t>
+            </a:fld>
+            <a:endParaRPr lang="en-US"/>
+          </a:p>
+        </p:txBody>
+      </p:sp>
+      <p:sp>
+        <p:nvSpPr>
+          <p:cNvPr id="7" name="Title 1">
+            <a:extLst>
+              <a:ext uri="{FF2B5EF4-FFF2-40B4-BE49-F238E27FC236}">
+                <a16:creationId xmlns:a16="http://schemas.microsoft.com/office/drawing/2014/main" id="{AED1E7B3-598B-AE4C-90CB-2D6A0E72EFA7}"/>
+              </a:ext>
+            </a:extLst>
+          </p:cNvPr>
+          <p:cNvSpPr>
+            <a:spLocks noGrp="1"/>
+          </p:cNvSpPr>
+          <p:nvPr>
+            <p:ph type="title"/>
+          </p:nvPr>
+        </p:nvSpPr>
+        <p:spPr>
+          <a:xfrm>
+            <a:off x="1676400" y="365125"/>
+            <a:ext cx="10515600" cy="1325563"/>
+          </a:xfrm>
+        </p:spPr>
+        <p:txBody>
+          <a:bodyPr/>
+          <a:lstStyle/>
+          <a:p>
+            <a:r>
+              <a:rPr lang="en-US" dirty="0" err="1"/>
+              <a:t>DecisionTree</a:t>
+            </a:r>
+            <a:r>
+              <a:rPr lang="en-US" dirty="0"/>
+              <a:t> Feature </a:t>
+            </a:r>
+            <a:r>
+              <a:rPr lang="en-US" dirty="0" err="1"/>
+              <a:t>Importances</a:t>
+            </a:r>
+            <a:endParaRPr lang="en-US" dirty="0"/>
+          </a:p>
+        </p:txBody>
+      </p:sp>
       <p:pic>
         <p:nvPicPr>
-          <p:cNvPr id="4" name="Picture 3">
-            <a:extLst>
-              <a:ext uri="{FF2B5EF4-FFF2-40B4-BE49-F238E27FC236}">
-                <a16:creationId xmlns:a16="http://schemas.microsoft.com/office/drawing/2014/main" id="{3E60603C-51C9-4948-87D7-77379CB162B4}"/>
+          <p:cNvPr id="8" name="Content Placeholder 4">
+            <a:extLst>
+              <a:ext uri="{FF2B5EF4-FFF2-40B4-BE49-F238E27FC236}">
+                <a16:creationId xmlns:a16="http://schemas.microsoft.com/office/drawing/2014/main" id="{7E3DAB13-F668-A845-A77B-35712A0041B1}"/>
               </a:ext>
             </a:extLst>
           </p:cNvPr>
@@ -5666,50 +5903,21 @@
           </a:stretch>
         </p:blipFill>
         <p:spPr>
-          <a:xfrm>
-            <a:off x="832050" y="3546475"/>
-            <a:ext cx="4762500" cy="3175000"/>
+          <a:xfrm rot="5400000">
+            <a:off x="-892770" y="-1147763"/>
+            <a:ext cx="682562" cy="4351338"/>
           </a:xfrm>
           <a:prstGeom prst="rect">
             <a:avLst/>
           </a:prstGeom>
         </p:spPr>
       </p:pic>
-      <p:sp>
-        <p:nvSpPr>
-          <p:cNvPr id="6" name="Slide Number Placeholder 5">
-            <a:extLst>
-              <a:ext uri="{FF2B5EF4-FFF2-40B4-BE49-F238E27FC236}">
-                <a16:creationId xmlns:a16="http://schemas.microsoft.com/office/drawing/2014/main" id="{26632AB1-2F28-6A42-92C3-AB2862884875}"/>
-              </a:ext>
-            </a:extLst>
-          </p:cNvPr>
-          <p:cNvSpPr>
-            <a:spLocks noGrp="1"/>
-          </p:cNvSpPr>
-          <p:nvPr>
-            <p:ph type="sldNum" sz="quarter" idx="12"/>
-          </p:nvPr>
-        </p:nvSpPr>
-        <p:spPr/>
-        <p:txBody>
-          <a:bodyPr/>
-          <a:lstStyle/>
-          <a:p>
-            <a:fld id="{052702CF-B793-8841-9D68-A44C3863FEDD}" type="slidenum">
-              <a:rPr lang="en-US" smtClean="0"/>
-              <a:t>17</a:t>
-            </a:fld>
-            <a:endParaRPr lang="en-US"/>
-          </a:p>
-        </p:txBody>
-      </p:sp>
       <p:pic>
         <p:nvPicPr>
-          <p:cNvPr id="7" name="Content Placeholder 4">
-            <a:extLst>
-              <a:ext uri="{FF2B5EF4-FFF2-40B4-BE49-F238E27FC236}">
-                <a16:creationId xmlns:a16="http://schemas.microsoft.com/office/drawing/2014/main" id="{CFC81969-2EDE-5040-9A20-D3D8FD90D17F}"/>
+          <p:cNvPr id="10" name="Content Placeholder 4">
+            <a:extLst>
+              <a:ext uri="{FF2B5EF4-FFF2-40B4-BE49-F238E27FC236}">
+                <a16:creationId xmlns:a16="http://schemas.microsoft.com/office/drawing/2014/main" id="{4030FEAE-F981-1449-BBF5-94444332F328}"/>
               </a:ext>
             </a:extLst>
           </p:cNvPr>
@@ -5719,135 +5927,15 @@
           <p:nvPr/>
         </p:nvPicPr>
         <p:blipFill>
-          <a:blip r:embed="rId4"/>
+          <a:blip r:embed="rId3"/>
           <a:stretch>
             <a:fillRect/>
           </a:stretch>
         </p:blipFill>
         <p:spPr>
           <a:xfrm rot="5400000">
-            <a:off x="1491488" y="-1135063"/>
+            <a:off x="11337164" y="-1130509"/>
             <a:ext cx="682562" cy="4351338"/>
-          </a:xfrm>
-          <a:prstGeom prst="rect">
-            <a:avLst/>
-          </a:prstGeom>
-        </p:spPr>
-      </p:pic>
-      <p:pic>
-        <p:nvPicPr>
-          <p:cNvPr id="8" name="Content Placeholder 4">
-            <a:extLst>
-              <a:ext uri="{FF2B5EF4-FFF2-40B4-BE49-F238E27FC236}">
-                <a16:creationId xmlns:a16="http://schemas.microsoft.com/office/drawing/2014/main" id="{6E8A8B88-EE2D-994C-94CD-EF346ACF7992}"/>
-              </a:ext>
-            </a:extLst>
-          </p:cNvPr>
-          <p:cNvPicPr>
-            <a:picLocks noChangeAspect="1"/>
-          </p:cNvPicPr>
-          <p:nvPr/>
-        </p:nvPicPr>
-        <p:blipFill>
-          <a:blip r:embed="rId4"/>
-          <a:stretch>
-            <a:fillRect/>
-          </a:stretch>
-        </p:blipFill>
-        <p:spPr>
-          <a:xfrm rot="5400000">
-            <a:off x="5842826" y="-1130511"/>
-            <a:ext cx="682562" cy="4351338"/>
-          </a:xfrm>
-          <a:prstGeom prst="rect">
-            <a:avLst/>
-          </a:prstGeom>
-        </p:spPr>
-      </p:pic>
-      <p:pic>
-        <p:nvPicPr>
-          <p:cNvPr id="9" name="Content Placeholder 4">
-            <a:extLst>
-              <a:ext uri="{FF2B5EF4-FFF2-40B4-BE49-F238E27FC236}">
-                <a16:creationId xmlns:a16="http://schemas.microsoft.com/office/drawing/2014/main" id="{274FCD01-1EA6-6047-B779-B40E7EABD42C}"/>
-              </a:ext>
-            </a:extLst>
-          </p:cNvPr>
-          <p:cNvPicPr>
-            <a:picLocks noChangeAspect="1"/>
-          </p:cNvPicPr>
-          <p:nvPr/>
-        </p:nvPicPr>
-        <p:blipFill>
-          <a:blip r:embed="rId4"/>
-          <a:stretch>
-            <a:fillRect/>
-          </a:stretch>
-        </p:blipFill>
-        <p:spPr>
-          <a:xfrm rot="5400000">
-            <a:off x="10194164" y="-1130509"/>
-            <a:ext cx="682562" cy="4351338"/>
-          </a:xfrm>
-          <a:prstGeom prst="rect">
-            <a:avLst/>
-          </a:prstGeom>
-        </p:spPr>
-      </p:pic>
-      <p:pic>
-        <p:nvPicPr>
-          <p:cNvPr id="3" name="Picture 2">
-            <a:extLst>
-              <a:ext uri="{FF2B5EF4-FFF2-40B4-BE49-F238E27FC236}">
-                <a16:creationId xmlns:a16="http://schemas.microsoft.com/office/drawing/2014/main" id="{1C836A23-F6EA-E644-B02D-F9C2649721B0}"/>
-              </a:ext>
-            </a:extLst>
-          </p:cNvPr>
-          <p:cNvPicPr>
-            <a:picLocks noChangeAspect="1"/>
-          </p:cNvPicPr>
-          <p:nvPr/>
-        </p:nvPicPr>
-        <p:blipFill>
-          <a:blip r:embed="rId5"/>
-          <a:stretch>
-            <a:fillRect/>
-          </a:stretch>
-        </p:blipFill>
-        <p:spPr>
-          <a:xfrm>
-            <a:off x="6330100" y="193850"/>
-            <a:ext cx="4762500" cy="3175000"/>
-          </a:xfrm>
-          <a:prstGeom prst="rect">
-            <a:avLst/>
-          </a:prstGeom>
-        </p:spPr>
-      </p:pic>
-      <p:pic>
-        <p:nvPicPr>
-          <p:cNvPr id="5" name="Picture 4">
-            <a:extLst>
-              <a:ext uri="{FF2B5EF4-FFF2-40B4-BE49-F238E27FC236}">
-                <a16:creationId xmlns:a16="http://schemas.microsoft.com/office/drawing/2014/main" id="{DED35832-D4F8-B94F-9431-E8A7F0007EB2}"/>
-              </a:ext>
-            </a:extLst>
-          </p:cNvPr>
-          <p:cNvPicPr>
-            <a:picLocks noChangeAspect="1"/>
-          </p:cNvPicPr>
-          <p:nvPr/>
-        </p:nvPicPr>
-        <p:blipFill>
-          <a:blip r:embed="rId6"/>
-          <a:stretch>
-            <a:fillRect/>
-          </a:stretch>
-        </p:blipFill>
-        <p:spPr>
-          <a:xfrm>
-            <a:off x="832050" y="173000"/>
-            <a:ext cx="4762500" cy="3175000"/>
           </a:xfrm>
           <a:prstGeom prst="rect">
             <a:avLst/>
@@ -5857,7 +5945,7 @@
     </p:spTree>
     <p:extLst>
       <p:ext uri="{BB962C8B-B14F-4D97-AF65-F5344CB8AC3E}">
-        <p14:creationId xmlns:p14="http://schemas.microsoft.com/office/powerpoint/2010/main" val="4099699027"/>
+        <p14:creationId xmlns:p14="http://schemas.microsoft.com/office/powerpoint/2010/main" val="4052448103"/>
       </p:ext>
     </p:extLst>
   </p:cSld>
@@ -5887,41 +5975,12 @@
           <a:chExt cx="0" cy="0"/>
         </a:xfrm>
       </p:grpSpPr>
-      <p:sp>
-        <p:nvSpPr>
-          <p:cNvPr id="4" name="Slide Number Placeholder 3">
-            <a:extLst>
-              <a:ext uri="{FF2B5EF4-FFF2-40B4-BE49-F238E27FC236}">
-                <a16:creationId xmlns:a16="http://schemas.microsoft.com/office/drawing/2014/main" id="{BCBFE378-F6E0-CC43-92DA-437DE6043516}"/>
-              </a:ext>
-            </a:extLst>
-          </p:cNvPr>
-          <p:cNvSpPr>
-            <a:spLocks noGrp="1"/>
-          </p:cNvSpPr>
-          <p:nvPr>
-            <p:ph type="sldNum" sz="quarter" idx="12"/>
-          </p:nvPr>
-        </p:nvSpPr>
-        <p:spPr/>
-        <p:txBody>
-          <a:bodyPr/>
-          <a:lstStyle/>
-          <a:p>
-            <a:fld id="{052702CF-B793-8841-9D68-A44C3863FEDD}" type="slidenum">
-              <a:rPr lang="en-US" smtClean="0"/>
-              <a:t>18</a:t>
-            </a:fld>
-            <a:endParaRPr lang="en-US"/>
-          </a:p>
-        </p:txBody>
-      </p:sp>
       <p:pic>
         <p:nvPicPr>
-          <p:cNvPr id="5" name="Picture 4">
-            <a:extLst>
-              <a:ext uri="{FF2B5EF4-FFF2-40B4-BE49-F238E27FC236}">
-                <a16:creationId xmlns:a16="http://schemas.microsoft.com/office/drawing/2014/main" id="{9B7E2DF6-0324-3E4E-8B9B-ADC70AF7BE90}"/>
+          <p:cNvPr id="2" name="Picture 1">
+            <a:extLst>
+              <a:ext uri="{FF2B5EF4-FFF2-40B4-BE49-F238E27FC236}">
+                <a16:creationId xmlns:a16="http://schemas.microsoft.com/office/drawing/2014/main" id="{B0D9EFFE-612C-0742-AC23-84668EDD7F01}"/>
               </a:ext>
             </a:extLst>
           </p:cNvPr>
@@ -5930,15 +5989,16 @@
           </p:cNvPicPr>
           <p:nvPr/>
         </p:nvPicPr>
-        <p:blipFill rotWithShape="1">
+        <p:blipFill>
           <a:blip r:embed="rId2"/>
-          <a:srcRect l="15412" r="8857"/>
-          <a:stretch/>
+          <a:stretch>
+            <a:fillRect/>
+          </a:stretch>
         </p:blipFill>
         <p:spPr>
           <a:xfrm>
-            <a:off x="3393778" y="1739900"/>
-            <a:ext cx="5229522" cy="4603626"/>
+            <a:off x="6330100" y="4076482"/>
+            <a:ext cx="3982300" cy="2654867"/>
           </a:xfrm>
           <a:prstGeom prst="rect">
             <a:avLst/>
@@ -5947,10 +6007,10 @@
       </p:pic>
       <p:pic>
         <p:nvPicPr>
-          <p:cNvPr id="6" name="Content Placeholder 4">
-            <a:extLst>
-              <a:ext uri="{FF2B5EF4-FFF2-40B4-BE49-F238E27FC236}">
-                <a16:creationId xmlns:a16="http://schemas.microsoft.com/office/drawing/2014/main" id="{A5B9B2C7-FE2A-6F47-9A5F-D498E0138430}"/>
+          <p:cNvPr id="4" name="Picture 3">
+            <a:extLst>
+              <a:ext uri="{FF2B5EF4-FFF2-40B4-BE49-F238E27FC236}">
+                <a16:creationId xmlns:a16="http://schemas.microsoft.com/office/drawing/2014/main" id="{3E60603C-51C9-4948-87D7-77379CB162B4}"/>
               </a:ext>
             </a:extLst>
           </p:cNvPr>
@@ -5966,21 +6026,50 @@
           </a:stretch>
         </p:blipFill>
         <p:spPr>
-          <a:xfrm rot="5400000">
-            <a:off x="1491488" y="-1135063"/>
-            <a:ext cx="682562" cy="4351338"/>
+          <a:xfrm>
+            <a:off x="1589925" y="4076482"/>
+            <a:ext cx="3982300" cy="2654867"/>
           </a:xfrm>
           <a:prstGeom prst="rect">
             <a:avLst/>
           </a:prstGeom>
         </p:spPr>
       </p:pic>
+      <p:sp>
+        <p:nvSpPr>
+          <p:cNvPr id="6" name="Slide Number Placeholder 5">
+            <a:extLst>
+              <a:ext uri="{FF2B5EF4-FFF2-40B4-BE49-F238E27FC236}">
+                <a16:creationId xmlns:a16="http://schemas.microsoft.com/office/drawing/2014/main" id="{26632AB1-2F28-6A42-92C3-AB2862884875}"/>
+              </a:ext>
+            </a:extLst>
+          </p:cNvPr>
+          <p:cNvSpPr>
+            <a:spLocks noGrp="1"/>
+          </p:cNvSpPr>
+          <p:nvPr>
+            <p:ph type="sldNum" sz="quarter" idx="12"/>
+          </p:nvPr>
+        </p:nvSpPr>
+        <p:spPr/>
+        <p:txBody>
+          <a:bodyPr/>
+          <a:lstStyle/>
+          <a:p>
+            <a:fld id="{052702CF-B793-8841-9D68-A44C3863FEDD}" type="slidenum">
+              <a:rPr lang="en-US" smtClean="0"/>
+              <a:t>18</a:t>
+            </a:fld>
+            <a:endParaRPr lang="en-US"/>
+          </a:p>
+        </p:txBody>
+      </p:sp>
       <p:pic>
         <p:nvPicPr>
-          <p:cNvPr id="7" name="Content Placeholder 4">
-            <a:extLst>
-              <a:ext uri="{FF2B5EF4-FFF2-40B4-BE49-F238E27FC236}">
-                <a16:creationId xmlns:a16="http://schemas.microsoft.com/office/drawing/2014/main" id="{B8C885D1-0DC6-EE47-9259-7623BC2F4BB4}"/>
+          <p:cNvPr id="3" name="Picture 2">
+            <a:extLst>
+              <a:ext uri="{FF2B5EF4-FFF2-40B4-BE49-F238E27FC236}">
+                <a16:creationId xmlns:a16="http://schemas.microsoft.com/office/drawing/2014/main" id="{1C836A23-F6EA-E644-B02D-F9C2649721B0}"/>
               </a:ext>
             </a:extLst>
           </p:cNvPr>
@@ -5990,15 +6079,15 @@
           <p:nvPr/>
         </p:nvPicPr>
         <p:blipFill>
-          <a:blip r:embed="rId3"/>
+          <a:blip r:embed="rId4"/>
           <a:stretch>
             <a:fillRect/>
           </a:stretch>
         </p:blipFill>
         <p:spPr>
-          <a:xfrm rot="5400000">
-            <a:off x="5842826" y="-1130511"/>
-            <a:ext cx="682562" cy="4351338"/>
+          <a:xfrm>
+            <a:off x="6330100" y="1421613"/>
+            <a:ext cx="3982300" cy="2654867"/>
           </a:xfrm>
           <a:prstGeom prst="rect">
             <a:avLst/>
@@ -6007,10 +6096,10 @@
       </p:pic>
       <p:pic>
         <p:nvPicPr>
-          <p:cNvPr id="8" name="Content Placeholder 4">
-            <a:extLst>
-              <a:ext uri="{FF2B5EF4-FFF2-40B4-BE49-F238E27FC236}">
-                <a16:creationId xmlns:a16="http://schemas.microsoft.com/office/drawing/2014/main" id="{87E4E365-ED7B-5148-A197-A0AF5AB3B770}"/>
+          <p:cNvPr id="5" name="Picture 4">
+            <a:extLst>
+              <a:ext uri="{FF2B5EF4-FFF2-40B4-BE49-F238E27FC236}">
+                <a16:creationId xmlns:a16="http://schemas.microsoft.com/office/drawing/2014/main" id="{DED35832-D4F8-B94F-9431-E8A7F0007EB2}"/>
               </a:ext>
             </a:extLst>
           </p:cNvPr>
@@ -6020,14 +6109,107 @@
           <p:nvPr/>
         </p:nvPicPr>
         <p:blipFill>
-          <a:blip r:embed="rId3"/>
+          <a:blip r:embed="rId5"/>
           <a:stretch>
             <a:fillRect/>
           </a:stretch>
         </p:blipFill>
         <p:spPr>
+          <a:xfrm>
+            <a:off x="1589925" y="1390991"/>
+            <a:ext cx="3982300" cy="2654867"/>
+          </a:xfrm>
+          <a:prstGeom prst="rect">
+            <a:avLst/>
+          </a:prstGeom>
+        </p:spPr>
+      </p:pic>
+      <p:sp>
+        <p:nvSpPr>
+          <p:cNvPr id="10" name="Title 1">
+            <a:extLst>
+              <a:ext uri="{FF2B5EF4-FFF2-40B4-BE49-F238E27FC236}">
+                <a16:creationId xmlns:a16="http://schemas.microsoft.com/office/drawing/2014/main" id="{E10CCC8F-E71F-3446-A266-2E82D40C6545}"/>
+              </a:ext>
+            </a:extLst>
+          </p:cNvPr>
+          <p:cNvSpPr>
+            <a:spLocks noGrp="1"/>
+          </p:cNvSpPr>
+          <p:nvPr>
+            <p:ph type="title"/>
+          </p:nvPr>
+        </p:nvSpPr>
+        <p:spPr>
+          <a:xfrm>
+            <a:off x="1676400" y="365125"/>
+            <a:ext cx="10515600" cy="1325563"/>
+          </a:xfrm>
+        </p:spPr>
+        <p:txBody>
+          <a:bodyPr/>
+          <a:lstStyle/>
+          <a:p>
+            <a:r>
+              <a:rPr lang="en-US" dirty="0"/>
+              <a:t>Other Confusion Matrices</a:t>
+            </a:r>
+          </a:p>
+        </p:txBody>
+      </p:sp>
+      <p:pic>
+        <p:nvPicPr>
+          <p:cNvPr id="11" name="Content Placeholder 4">
+            <a:extLst>
+              <a:ext uri="{FF2B5EF4-FFF2-40B4-BE49-F238E27FC236}">
+                <a16:creationId xmlns:a16="http://schemas.microsoft.com/office/drawing/2014/main" id="{4E654F05-9B65-8D42-B033-95449F1CF969}"/>
+              </a:ext>
+            </a:extLst>
+          </p:cNvPr>
+          <p:cNvPicPr>
+            <a:picLocks noChangeAspect="1"/>
+          </p:cNvPicPr>
+          <p:nvPr/>
+        </p:nvPicPr>
+        <p:blipFill>
+          <a:blip r:embed="rId6"/>
+          <a:stretch>
+            <a:fillRect/>
+          </a:stretch>
+        </p:blipFill>
+        <p:spPr>
           <a:xfrm rot="5400000">
-            <a:off x="10194164" y="-1130509"/>
+            <a:off x="-892770" y="-1147763"/>
+            <a:ext cx="682562" cy="4351338"/>
+          </a:xfrm>
+          <a:prstGeom prst="rect">
+            <a:avLst/>
+          </a:prstGeom>
+        </p:spPr>
+      </p:pic>
+      <p:pic>
+        <p:nvPicPr>
+          <p:cNvPr id="13" name="Content Placeholder 4">
+            <a:extLst>
+              <a:ext uri="{FF2B5EF4-FFF2-40B4-BE49-F238E27FC236}">
+                <a16:creationId xmlns:a16="http://schemas.microsoft.com/office/drawing/2014/main" id="{912B7F88-BAA5-F941-8094-8065835DA5FC}"/>
+              </a:ext>
+            </a:extLst>
+          </p:cNvPr>
+          <p:cNvPicPr>
+            <a:picLocks noChangeAspect="1"/>
+          </p:cNvPicPr>
+          <p:nvPr/>
+        </p:nvPicPr>
+        <p:blipFill>
+          <a:blip r:embed="rId6"/>
+          <a:stretch>
+            <a:fillRect/>
+          </a:stretch>
+        </p:blipFill>
+        <p:spPr>
+          <a:xfrm rot="5400000">
+            <a:off x="9673464" y="-1130509"/>
             <a:ext cx="682562" cy="4351338"/>
           </a:xfrm>
           <a:prstGeom prst="rect">
@@ -6038,7 +6220,7 @@
     </p:spTree>
     <p:extLst>
       <p:ext uri="{BB962C8B-B14F-4D97-AF65-F5344CB8AC3E}">
-        <p14:creationId xmlns:p14="http://schemas.microsoft.com/office/powerpoint/2010/main" val="748950635"/>
+        <p14:creationId xmlns:p14="http://schemas.microsoft.com/office/powerpoint/2010/main" val="4099699027"/>
       </p:ext>
     </p:extLst>
   </p:cSld>
@@ -6070,10 +6252,10 @@
       </p:grpSpPr>
       <p:sp>
         <p:nvSpPr>
-          <p:cNvPr id="2" name="Slide Number Placeholder 1">
-            <a:extLst>
-              <a:ext uri="{FF2B5EF4-FFF2-40B4-BE49-F238E27FC236}">
-                <a16:creationId xmlns:a16="http://schemas.microsoft.com/office/drawing/2014/main" id="{C44BCCFB-A21A-5747-93FB-B891B614DCD7}"/>
+          <p:cNvPr id="4" name="Slide Number Placeholder 3">
+            <a:extLst>
+              <a:ext uri="{FF2B5EF4-FFF2-40B4-BE49-F238E27FC236}">
+                <a16:creationId xmlns:a16="http://schemas.microsoft.com/office/drawing/2014/main" id="{BCBFE378-F6E0-CC43-92DA-437DE6043516}"/>
               </a:ext>
             </a:extLst>
           </p:cNvPr>
@@ -6097,134 +6279,78 @@
           </a:p>
         </p:txBody>
       </p:sp>
-      <p:sp>
-        <p:nvSpPr>
-          <p:cNvPr id="3" name="Rectangle 2">
-            <a:extLst>
-              <a:ext uri="{FF2B5EF4-FFF2-40B4-BE49-F238E27FC236}">
-                <a16:creationId xmlns:a16="http://schemas.microsoft.com/office/drawing/2014/main" id="{4C5E6266-E115-4746-AE95-6A7A72565CEE}"/>
-              </a:ext>
-            </a:extLst>
-          </p:cNvPr>
-          <p:cNvSpPr/>
+      <p:pic>
+        <p:nvPicPr>
+          <p:cNvPr id="5" name="Picture 4">
+            <a:extLst>
+              <a:ext uri="{FF2B5EF4-FFF2-40B4-BE49-F238E27FC236}">
+                <a16:creationId xmlns:a16="http://schemas.microsoft.com/office/drawing/2014/main" id="{9B7E2DF6-0324-3E4E-8B9B-ADC70AF7BE90}"/>
+              </a:ext>
+            </a:extLst>
+          </p:cNvPr>
+          <p:cNvPicPr>
+            <a:picLocks noChangeAspect="1"/>
+          </p:cNvPicPr>
           <p:nvPr/>
-        </p:nvSpPr>
+        </p:nvPicPr>
+        <p:blipFill rotWithShape="1">
+          <a:blip r:embed="rId2"/>
+          <a:srcRect l="15412" r="8857"/>
+          <a:stretch/>
+        </p:blipFill>
         <p:spPr>
           <a:xfrm>
-            <a:off x="3352800" y="1930906"/>
-            <a:ext cx="6096000" cy="3785652"/>
+            <a:off x="3393778" y="1739900"/>
+            <a:ext cx="5229522" cy="4603626"/>
           </a:xfrm>
           <a:prstGeom prst="rect">
             <a:avLst/>
           </a:prstGeom>
         </p:spPr>
-        <p:txBody>
-          <a:bodyPr>
-            <a:spAutoFit/>
-          </a:bodyPr>
-          <a:lstStyle/>
-          <a:p>
-            <a:pPr marL="285750" indent="-285750">
-              <a:buFont typeface="Arial" panose="020B0604020202020204" pitchFamily="34" charset="0"/>
-              <a:buChar char="•"/>
-            </a:pPr>
-            <a:r>
-              <a:rPr lang="en-US" sz="2400" dirty="0"/>
-              <a:t>Categorical features</a:t>
-            </a:r>
-          </a:p>
-          <a:p>
-            <a:pPr marL="742950" lvl="1" indent="-285750">
-              <a:buFont typeface="Arial" panose="020B0604020202020204" pitchFamily="34" charset="0"/>
-              <a:buChar char="•"/>
-            </a:pPr>
-            <a:r>
-              <a:rPr lang="en-US" sz="2400" dirty="0"/>
-              <a:t>SYMBOL – Name of the gene</a:t>
-            </a:r>
-          </a:p>
-          <a:p>
-            <a:pPr marL="742950" lvl="1" indent="-285750">
-              <a:buFont typeface="Arial" panose="020B0604020202020204" pitchFamily="34" charset="0"/>
-              <a:buChar char="•"/>
-            </a:pPr>
-            <a:r>
-              <a:rPr lang="en-US" sz="2400" dirty="0"/>
-              <a:t>CLNVC – Variant type</a:t>
-            </a:r>
-          </a:p>
-          <a:p>
-            <a:pPr marL="742950" lvl="1" indent="-285750">
-              <a:buFont typeface="Arial" panose="020B0604020202020204" pitchFamily="34" charset="0"/>
-              <a:buChar char="•"/>
-            </a:pPr>
-            <a:r>
-              <a:rPr lang="en-US" sz="2400" dirty="0"/>
-              <a:t>IMPACT – Impact of the variant</a:t>
-            </a:r>
-          </a:p>
-          <a:p>
-            <a:pPr marL="285750" indent="-285750">
-              <a:buFont typeface="Arial" panose="020B0604020202020204" pitchFamily="34" charset="0"/>
-              <a:buChar char="•"/>
-            </a:pPr>
-            <a:r>
-              <a:rPr lang="en-US" sz="2400" dirty="0"/>
-              <a:t>Numeric features </a:t>
-            </a:r>
-          </a:p>
-          <a:p>
-            <a:pPr marL="742950" lvl="1" indent="-285750">
-              <a:buFont typeface="Arial" panose="020B0604020202020204" pitchFamily="34" charset="0"/>
-              <a:buChar char="•"/>
-            </a:pPr>
-            <a:r>
-              <a:rPr lang="en-US" sz="2400" dirty="0"/>
-              <a:t>AF_TGP – Frequency of allele</a:t>
-            </a:r>
-          </a:p>
-          <a:p>
-            <a:pPr marL="742950" lvl="1" indent="-285750">
-              <a:buFont typeface="Arial" panose="020B0604020202020204" pitchFamily="34" charset="0"/>
-              <a:buChar char="•"/>
-            </a:pPr>
-            <a:r>
-              <a:rPr lang="en-US" sz="2400" dirty="0"/>
-              <a:t>CADD_PHRED – ‘Deleteriousness’ score</a:t>
-            </a:r>
-          </a:p>
-          <a:p>
-            <a:pPr marL="742950" lvl="1" indent="-285750">
-              <a:buFont typeface="Arial" panose="020B0604020202020204" pitchFamily="34" charset="0"/>
-              <a:buChar char="•"/>
-            </a:pPr>
-            <a:r>
-              <a:rPr lang="en-US" sz="2400" dirty="0" err="1"/>
-              <a:t>LoFtool</a:t>
-            </a:r>
-            <a:r>
-              <a:rPr lang="en-US" sz="2400" dirty="0"/>
-              <a:t> – Loss of function score</a:t>
-            </a:r>
-          </a:p>
-          <a:p>
-            <a:pPr marL="742950" lvl="1" indent="-285750">
-              <a:buFont typeface="Arial" panose="020B0604020202020204" pitchFamily="34" charset="0"/>
-              <a:buChar char="•"/>
-            </a:pPr>
-            <a:r>
-              <a:rPr lang="en-US" sz="2400" dirty="0"/>
-              <a:t>Strand – Forward or backward DNA strand</a:t>
+      </p:pic>
+      <p:sp>
+        <p:nvSpPr>
+          <p:cNvPr id="9" name="Title 1">
+            <a:extLst>
+              <a:ext uri="{FF2B5EF4-FFF2-40B4-BE49-F238E27FC236}">
+                <a16:creationId xmlns:a16="http://schemas.microsoft.com/office/drawing/2014/main" id="{5DB82002-2765-3A40-A575-0DDFF8764B76}"/>
+              </a:ext>
+            </a:extLst>
+          </p:cNvPr>
+          <p:cNvSpPr>
+            <a:spLocks noGrp="1"/>
+          </p:cNvSpPr>
+          <p:nvPr>
+            <p:ph type="title"/>
+          </p:nvPr>
+        </p:nvSpPr>
+        <p:spPr>
+          <a:xfrm>
+            <a:off x="1676400" y="365125"/>
+            <a:ext cx="10515600" cy="1325563"/>
+          </a:xfrm>
+        </p:spPr>
+        <p:txBody>
+          <a:bodyPr/>
+          <a:lstStyle/>
+          <a:p>
+            <a:r>
+              <a:rPr lang="en-US" dirty="0" err="1"/>
+              <a:t>RandomForest</a:t>
+            </a:r>
+            <a:r>
+              <a:rPr lang="en-US" dirty="0"/>
+              <a:t> Train Confusion Matrix</a:t>
             </a:r>
           </a:p>
         </p:txBody>
       </p:sp>
       <p:pic>
         <p:nvPicPr>
-          <p:cNvPr id="4" name="Content Placeholder 4">
-            <a:extLst>
-              <a:ext uri="{FF2B5EF4-FFF2-40B4-BE49-F238E27FC236}">
-                <a16:creationId xmlns:a16="http://schemas.microsoft.com/office/drawing/2014/main" id="{E2B526C6-A231-5A47-A009-5425BF04A671}"/>
+          <p:cNvPr id="10" name="Content Placeholder 4">
+            <a:extLst>
+              <a:ext uri="{FF2B5EF4-FFF2-40B4-BE49-F238E27FC236}">
+                <a16:creationId xmlns:a16="http://schemas.microsoft.com/office/drawing/2014/main" id="{1E45EDFD-EB92-F645-B853-0DFFD6DC73F3}"/>
               </a:ext>
             </a:extLst>
           </p:cNvPr>
@@ -6234,14 +6360,14 @@
           <p:nvPr/>
         </p:nvPicPr>
         <p:blipFill>
-          <a:blip r:embed="rId2"/>
+          <a:blip r:embed="rId3"/>
           <a:stretch>
             <a:fillRect/>
           </a:stretch>
         </p:blipFill>
         <p:spPr>
           <a:xfrm rot="5400000">
-            <a:off x="1491488" y="-1135063"/>
+            <a:off x="-892770" y="-1147763"/>
             <a:ext cx="682562" cy="4351338"/>
           </a:xfrm>
           <a:prstGeom prst="rect">
@@ -6251,10 +6377,10 @@
       </p:pic>
       <p:pic>
         <p:nvPicPr>
-          <p:cNvPr id="5" name="Content Placeholder 4">
-            <a:extLst>
-              <a:ext uri="{FF2B5EF4-FFF2-40B4-BE49-F238E27FC236}">
-                <a16:creationId xmlns:a16="http://schemas.microsoft.com/office/drawing/2014/main" id="{F64249EA-8DD2-A840-9037-C240592E0491}"/>
+          <p:cNvPr id="12" name="Content Placeholder 4">
+            <a:extLst>
+              <a:ext uri="{FF2B5EF4-FFF2-40B4-BE49-F238E27FC236}">
+                <a16:creationId xmlns:a16="http://schemas.microsoft.com/office/drawing/2014/main" id="{72A98B9F-7D56-F74A-8852-5A5243C49976}"/>
               </a:ext>
             </a:extLst>
           </p:cNvPr>
@@ -6264,44 +6390,14 @@
           <p:nvPr/>
         </p:nvPicPr>
         <p:blipFill>
-          <a:blip r:embed="rId2"/>
+          <a:blip r:embed="rId3"/>
           <a:stretch>
             <a:fillRect/>
           </a:stretch>
         </p:blipFill>
         <p:spPr>
           <a:xfrm rot="5400000">
-            <a:off x="5842826" y="-1130511"/>
-            <a:ext cx="682562" cy="4351338"/>
-          </a:xfrm>
-          <a:prstGeom prst="rect">
-            <a:avLst/>
-          </a:prstGeom>
-        </p:spPr>
-      </p:pic>
-      <p:pic>
-        <p:nvPicPr>
-          <p:cNvPr id="6" name="Content Placeholder 4">
-            <a:extLst>
-              <a:ext uri="{FF2B5EF4-FFF2-40B4-BE49-F238E27FC236}">
-                <a16:creationId xmlns:a16="http://schemas.microsoft.com/office/drawing/2014/main" id="{B91A4A8E-0461-194F-92E5-973C01585156}"/>
-              </a:ext>
-            </a:extLst>
-          </p:cNvPr>
-          <p:cNvPicPr>
-            <a:picLocks noChangeAspect="1"/>
-          </p:cNvPicPr>
-          <p:nvPr/>
-        </p:nvPicPr>
-        <p:blipFill>
-          <a:blip r:embed="rId2"/>
-          <a:stretch>
-            <a:fillRect/>
-          </a:stretch>
-        </p:blipFill>
-        <p:spPr>
-          <a:xfrm rot="5400000">
-            <a:off x="10194164" y="-1130509"/>
+            <a:off x="12137264" y="-1130509"/>
             <a:ext cx="682562" cy="4351338"/>
           </a:xfrm>
           <a:prstGeom prst="rect">
@@ -6312,7 +6408,7 @@
     </p:spTree>
     <p:extLst>
       <p:ext uri="{BB962C8B-B14F-4D97-AF65-F5344CB8AC3E}">
-        <p14:creationId xmlns:p14="http://schemas.microsoft.com/office/powerpoint/2010/main" val="1849644182"/>
+        <p14:creationId xmlns:p14="http://schemas.microsoft.com/office/powerpoint/2010/main" val="748950635"/>
       </p:ext>
     </p:extLst>
   </p:cSld>
@@ -6370,7 +6466,7 @@
           <a:p>
             <a:r>
               <a:rPr lang="en-US" dirty="0"/>
-              <a:t>DNA Primer</a:t>
+              <a:t>Gene Variant Primer</a:t>
             </a:r>
           </a:p>
         </p:txBody>
@@ -6426,7 +6522,7 @@
         </p:blipFill>
         <p:spPr>
           <a:xfrm rot="5400000">
-            <a:off x="6338126" y="-1130511"/>
+            <a:off x="8154226" y="-1130511"/>
             <a:ext cx="682562" cy="4351338"/>
           </a:xfrm>
           <a:prstGeom prst="rect">
@@ -6456,7 +6552,7 @@
         </p:blipFill>
         <p:spPr>
           <a:xfrm rot="5400000">
-            <a:off x="10689464" y="-1130509"/>
+            <a:off x="12505564" y="-1130509"/>
             <a:ext cx="682562" cy="4351338"/>
           </a:xfrm>
           <a:prstGeom prst="rect">
@@ -6527,7 +6623,7 @@
             </a:pPr>
             <a:r>
               <a:rPr lang="en-US" sz="2800" dirty="0"/>
-              <a:t>We all have DNA and genes </a:t>
+              <a:t>We all have genes, some of which are variants</a:t>
             </a:r>
           </a:p>
           <a:p>
@@ -6535,10 +6631,7 @@
               <a:buFont typeface="Arial" panose="020B0604020202020204" pitchFamily="34" charset="0"/>
               <a:buChar char="•"/>
             </a:pPr>
-            <a:r>
-              <a:rPr lang="en-US" sz="2800" dirty="0"/>
-              <a:t>Some of those genes are variants </a:t>
-            </a:r>
+            <a:endParaRPr lang="en-US" sz="2800" dirty="0"/>
           </a:p>
           <a:p>
             <a:pPr marL="285750" indent="-285750">
@@ -6555,7 +6648,7 @@
             </a:r>
             <a:r>
               <a:rPr lang="en-US" sz="2800" dirty="0"/>
-              <a:t> SNP) or rare (mutations)</a:t>
+              <a:t> SNP) or rare</a:t>
             </a:r>
           </a:p>
           <a:p>
@@ -6563,9 +6656,16 @@
               <a:buFont typeface="Arial" panose="020B0604020202020204" pitchFamily="34" charset="0"/>
               <a:buChar char="•"/>
             </a:pPr>
+            <a:endParaRPr lang="en-US" sz="2800" dirty="0"/>
+          </a:p>
+          <a:p>
+            <a:pPr marL="285750" indent="-285750">
+              <a:buFont typeface="Arial" panose="020B0604020202020204" pitchFamily="34" charset="0"/>
+              <a:buChar char="•"/>
+            </a:pPr>
             <a:r>
               <a:rPr lang="en-US" sz="2800" dirty="0"/>
-              <a:t>Variants might have little to no effect, or a negative effect (sometimes but far less often a positive effect)</a:t>
+              <a:t>Variants might have little to no effect, or a negative effect – these can be related to various diseases</a:t>
             </a:r>
           </a:p>
           <a:p>
@@ -6611,6 +6711,313 @@
     <p:extLst>
       <p:ext uri="{BB962C8B-B14F-4D97-AF65-F5344CB8AC3E}">
         <p14:creationId xmlns:p14="http://schemas.microsoft.com/office/powerpoint/2010/main" val="2667249955"/>
+      </p:ext>
+    </p:extLst>
+  </p:cSld>
+  <p:clrMapOvr>
+    <a:masterClrMapping/>
+  </p:clrMapOvr>
+  <p:transition spd="slow">
+    <p:push/>
+  </p:transition>
+</p:sld>
+</file>
+
+<file path=ppt/slides/slide20.xml><?xml version="1.0" encoding="utf-8"?>
+<p:sld xmlns:a="http://schemas.openxmlformats.org/drawingml/2006/main" xmlns:r="http://schemas.openxmlformats.org/officeDocument/2006/relationships" xmlns:p="http://schemas.openxmlformats.org/presentationml/2006/main">
+  <p:cSld>
+    <p:spTree>
+      <p:nvGrpSpPr>
+        <p:cNvPr id="1" name=""/>
+        <p:cNvGrpSpPr/>
+        <p:nvPr/>
+      </p:nvGrpSpPr>
+      <p:grpSpPr>
+        <a:xfrm>
+          <a:off x="0" y="0"/>
+          <a:ext cx="0" cy="0"/>
+          <a:chOff x="0" y="0"/>
+          <a:chExt cx="0" cy="0"/>
+        </a:xfrm>
+      </p:grpSpPr>
+      <p:sp>
+        <p:nvSpPr>
+          <p:cNvPr id="2" name="Slide Number Placeholder 1">
+            <a:extLst>
+              <a:ext uri="{FF2B5EF4-FFF2-40B4-BE49-F238E27FC236}">
+                <a16:creationId xmlns:a16="http://schemas.microsoft.com/office/drawing/2014/main" id="{C44BCCFB-A21A-5747-93FB-B891B614DCD7}"/>
+              </a:ext>
+            </a:extLst>
+          </p:cNvPr>
+          <p:cNvSpPr>
+            <a:spLocks noGrp="1"/>
+          </p:cNvSpPr>
+          <p:nvPr>
+            <p:ph type="sldNum" sz="quarter" idx="12"/>
+          </p:nvPr>
+        </p:nvSpPr>
+        <p:spPr/>
+        <p:txBody>
+          <a:bodyPr/>
+          <a:lstStyle/>
+          <a:p>
+            <a:fld id="{052702CF-B793-8841-9D68-A44C3863FEDD}" type="slidenum">
+              <a:rPr lang="en-US" smtClean="0"/>
+              <a:t>20</a:t>
+            </a:fld>
+            <a:endParaRPr lang="en-US"/>
+          </a:p>
+        </p:txBody>
+      </p:sp>
+      <p:sp>
+        <p:nvSpPr>
+          <p:cNvPr id="3" name="Rectangle 2">
+            <a:extLst>
+              <a:ext uri="{FF2B5EF4-FFF2-40B4-BE49-F238E27FC236}">
+                <a16:creationId xmlns:a16="http://schemas.microsoft.com/office/drawing/2014/main" id="{4C5E6266-E115-4746-AE95-6A7A72565CEE}"/>
+              </a:ext>
+            </a:extLst>
+          </p:cNvPr>
+          <p:cNvSpPr/>
+          <p:nvPr/>
+        </p:nvSpPr>
+        <p:spPr>
+          <a:xfrm>
+            <a:off x="3352800" y="1930906"/>
+            <a:ext cx="6096000" cy="3785652"/>
+          </a:xfrm>
+          <a:prstGeom prst="rect">
+            <a:avLst/>
+          </a:prstGeom>
+        </p:spPr>
+        <p:txBody>
+          <a:bodyPr>
+            <a:spAutoFit/>
+          </a:bodyPr>
+          <a:lstStyle/>
+          <a:p>
+            <a:pPr marL="285750" indent="-285750">
+              <a:buFont typeface="Arial" panose="020B0604020202020204" pitchFamily="34" charset="0"/>
+              <a:buChar char="•"/>
+            </a:pPr>
+            <a:r>
+              <a:rPr lang="en-US" sz="2400" dirty="0"/>
+              <a:t>Categorical features</a:t>
+            </a:r>
+          </a:p>
+          <a:p>
+            <a:pPr marL="742950" lvl="1" indent="-285750">
+              <a:buFont typeface="Arial" panose="020B0604020202020204" pitchFamily="34" charset="0"/>
+              <a:buChar char="•"/>
+            </a:pPr>
+            <a:r>
+              <a:rPr lang="en-US" sz="2400" dirty="0"/>
+              <a:t>SYMBOL – Name of the gene</a:t>
+            </a:r>
+          </a:p>
+          <a:p>
+            <a:pPr marL="742950" lvl="1" indent="-285750">
+              <a:buFont typeface="Arial" panose="020B0604020202020204" pitchFamily="34" charset="0"/>
+              <a:buChar char="•"/>
+            </a:pPr>
+            <a:r>
+              <a:rPr lang="en-US" sz="2400" dirty="0"/>
+              <a:t>CLNVC – Variant type</a:t>
+            </a:r>
+          </a:p>
+          <a:p>
+            <a:pPr marL="742950" lvl="1" indent="-285750">
+              <a:buFont typeface="Arial" panose="020B0604020202020204" pitchFamily="34" charset="0"/>
+              <a:buChar char="•"/>
+            </a:pPr>
+            <a:r>
+              <a:rPr lang="en-US" sz="2400" dirty="0"/>
+              <a:t>IMPACT – Impact of the variant</a:t>
+            </a:r>
+          </a:p>
+          <a:p>
+            <a:pPr marL="285750" indent="-285750">
+              <a:buFont typeface="Arial" panose="020B0604020202020204" pitchFamily="34" charset="0"/>
+              <a:buChar char="•"/>
+            </a:pPr>
+            <a:r>
+              <a:rPr lang="en-US" sz="2400" dirty="0"/>
+              <a:t>Numeric features </a:t>
+            </a:r>
+          </a:p>
+          <a:p>
+            <a:pPr marL="742950" lvl="1" indent="-285750">
+              <a:buFont typeface="Arial" panose="020B0604020202020204" pitchFamily="34" charset="0"/>
+              <a:buChar char="•"/>
+            </a:pPr>
+            <a:r>
+              <a:rPr lang="en-US" sz="2400" dirty="0"/>
+              <a:t>AF_TGP – Frequency of allele</a:t>
+            </a:r>
+          </a:p>
+          <a:p>
+            <a:pPr marL="742950" lvl="1" indent="-285750">
+              <a:buFont typeface="Arial" panose="020B0604020202020204" pitchFamily="34" charset="0"/>
+              <a:buChar char="•"/>
+            </a:pPr>
+            <a:r>
+              <a:rPr lang="en-US" sz="2400" dirty="0"/>
+              <a:t>CADD_PHRED – ‘Deleteriousness’ score</a:t>
+            </a:r>
+          </a:p>
+          <a:p>
+            <a:pPr marL="742950" lvl="1" indent="-285750">
+              <a:buFont typeface="Arial" panose="020B0604020202020204" pitchFamily="34" charset="0"/>
+              <a:buChar char="•"/>
+            </a:pPr>
+            <a:r>
+              <a:rPr lang="en-US" sz="2400" dirty="0" err="1"/>
+              <a:t>LoFtool</a:t>
+            </a:r>
+            <a:r>
+              <a:rPr lang="en-US" sz="2400" dirty="0"/>
+              <a:t> – Loss of function score</a:t>
+            </a:r>
+          </a:p>
+          <a:p>
+            <a:pPr marL="742950" lvl="1" indent="-285750">
+              <a:buFont typeface="Arial" panose="020B0604020202020204" pitchFamily="34" charset="0"/>
+              <a:buChar char="•"/>
+            </a:pPr>
+            <a:r>
+              <a:rPr lang="en-US" sz="2400" dirty="0"/>
+              <a:t>Strand – Forward or backward DNA strand</a:t>
+            </a:r>
+          </a:p>
+        </p:txBody>
+      </p:sp>
+      <p:sp>
+        <p:nvSpPr>
+          <p:cNvPr id="7" name="Title 1">
+            <a:extLst>
+              <a:ext uri="{FF2B5EF4-FFF2-40B4-BE49-F238E27FC236}">
+                <a16:creationId xmlns:a16="http://schemas.microsoft.com/office/drawing/2014/main" id="{23E5F4B7-985E-9641-B86C-3CE9FE94026A}"/>
+              </a:ext>
+            </a:extLst>
+          </p:cNvPr>
+          <p:cNvSpPr>
+            <a:spLocks noGrp="1"/>
+          </p:cNvSpPr>
+          <p:nvPr>
+            <p:ph type="title"/>
+          </p:nvPr>
+        </p:nvSpPr>
+        <p:spPr>
+          <a:xfrm>
+            <a:off x="1676400" y="365125"/>
+            <a:ext cx="10515600" cy="1325563"/>
+          </a:xfrm>
+        </p:spPr>
+        <p:txBody>
+          <a:bodyPr/>
+          <a:lstStyle/>
+          <a:p>
+            <a:r>
+              <a:rPr lang="en-US" dirty="0"/>
+              <a:t>Feature Descriptions</a:t>
+            </a:r>
+          </a:p>
+        </p:txBody>
+      </p:sp>
+      <p:pic>
+        <p:nvPicPr>
+          <p:cNvPr id="8" name="Content Placeholder 4">
+            <a:extLst>
+              <a:ext uri="{FF2B5EF4-FFF2-40B4-BE49-F238E27FC236}">
+                <a16:creationId xmlns:a16="http://schemas.microsoft.com/office/drawing/2014/main" id="{BD1EE5DE-5D4F-AD4B-9F57-9404F0FEA3B1}"/>
+              </a:ext>
+            </a:extLst>
+          </p:cNvPr>
+          <p:cNvPicPr>
+            <a:picLocks noChangeAspect="1"/>
+          </p:cNvPicPr>
+          <p:nvPr/>
+        </p:nvPicPr>
+        <p:blipFill>
+          <a:blip r:embed="rId2"/>
+          <a:stretch>
+            <a:fillRect/>
+          </a:stretch>
+        </p:blipFill>
+        <p:spPr>
+          <a:xfrm rot="5400000">
+            <a:off x="-892770" y="-1147763"/>
+            <a:ext cx="682562" cy="4351338"/>
+          </a:xfrm>
+          <a:prstGeom prst="rect">
+            <a:avLst/>
+          </a:prstGeom>
+        </p:spPr>
+      </p:pic>
+      <p:pic>
+        <p:nvPicPr>
+          <p:cNvPr id="9" name="Content Placeholder 4">
+            <a:extLst>
+              <a:ext uri="{FF2B5EF4-FFF2-40B4-BE49-F238E27FC236}">
+                <a16:creationId xmlns:a16="http://schemas.microsoft.com/office/drawing/2014/main" id="{A177D1B8-4962-7349-8CD3-BF19EBE850A6}"/>
+              </a:ext>
+            </a:extLst>
+          </p:cNvPr>
+          <p:cNvPicPr>
+            <a:picLocks noChangeAspect="1"/>
+          </p:cNvPicPr>
+          <p:nvPr/>
+        </p:nvPicPr>
+        <p:blipFill>
+          <a:blip r:embed="rId2"/>
+          <a:stretch>
+            <a:fillRect/>
+          </a:stretch>
+        </p:blipFill>
+        <p:spPr>
+          <a:xfrm rot="5400000">
+            <a:off x="8281226" y="-1130511"/>
+            <a:ext cx="682562" cy="4351338"/>
+          </a:xfrm>
+          <a:prstGeom prst="rect">
+            <a:avLst/>
+          </a:prstGeom>
+        </p:spPr>
+      </p:pic>
+      <p:pic>
+        <p:nvPicPr>
+          <p:cNvPr id="10" name="Content Placeholder 4">
+            <a:extLst>
+              <a:ext uri="{FF2B5EF4-FFF2-40B4-BE49-F238E27FC236}">
+                <a16:creationId xmlns:a16="http://schemas.microsoft.com/office/drawing/2014/main" id="{3B90A53F-DD93-954D-9B7E-C55C76CC3AF1}"/>
+              </a:ext>
+            </a:extLst>
+          </p:cNvPr>
+          <p:cNvPicPr>
+            <a:picLocks noChangeAspect="1"/>
+          </p:cNvPicPr>
+          <p:nvPr/>
+        </p:nvPicPr>
+        <p:blipFill>
+          <a:blip r:embed="rId2"/>
+          <a:stretch>
+            <a:fillRect/>
+          </a:stretch>
+        </p:blipFill>
+        <p:spPr>
+          <a:xfrm rot="5400000">
+            <a:off x="12632564" y="-1130509"/>
+            <a:ext cx="682562" cy="4351338"/>
+          </a:xfrm>
+          <a:prstGeom prst="rect">
+            <a:avLst/>
+          </a:prstGeom>
+        </p:spPr>
+      </p:pic>
+    </p:spTree>
+    <p:extLst>
+      <p:ext uri="{BB962C8B-B14F-4D97-AF65-F5344CB8AC3E}">
+        <p14:creationId xmlns:p14="http://schemas.microsoft.com/office/powerpoint/2010/main" val="1849644182"/>
       </p:ext>
     </p:extLst>
   </p:cSld>
@@ -6668,7 +7075,7 @@
           <a:p>
             <a:r>
               <a:rPr lang="en-US" dirty="0"/>
-              <a:t>Gene Classification</a:t>
+              <a:t>Variant Classification</a:t>
             </a:r>
           </a:p>
         </p:txBody>
@@ -6724,7 +7131,7 @@
         </p:blipFill>
         <p:spPr>
           <a:xfrm rot="5400000">
-            <a:off x="7849426" y="-1130511"/>
+            <a:off x="8293926" y="-1130511"/>
             <a:ext cx="682562" cy="4351338"/>
           </a:xfrm>
           <a:prstGeom prst="rect">
@@ -6754,7 +7161,7 @@
         </p:blipFill>
         <p:spPr>
           <a:xfrm rot="5400000">
-            <a:off x="12200764" y="-1130509"/>
+            <a:off x="12645264" y="-1130509"/>
             <a:ext cx="682562" cy="4351338"/>
           </a:xfrm>
           <a:prstGeom prst="rect">
@@ -7382,7 +7789,7 @@
         <p:spPr>
           <a:xfrm>
             <a:off x="558800" y="1905000"/>
-            <a:ext cx="10795000" cy="3108543"/>
+            <a:ext cx="10795000" cy="3539430"/>
           </a:xfrm>
           <a:prstGeom prst="rect">
             <a:avLst/>
@@ -7451,7 +7858,7 @@
             </a:r>
             <a:r>
               <a:rPr lang="en-US" sz="2800" dirty="0"/>
-              <a:t> can better respond to lab results for </a:t>
+              <a:t> can better plan </a:t>
             </a:r>
             <a:r>
               <a:rPr lang="en-US" sz="2800" dirty="0">
@@ -7463,7 +7870,7 @@
             </a:r>
             <a:r>
               <a:rPr lang="en-US" sz="2800" dirty="0"/>
-              <a:t> treatment</a:t>
+              <a:t> treatment and respond to lab results</a:t>
             </a:r>
           </a:p>
         </p:txBody>
@@ -7707,12 +8114,11 @@
             </a:r>
             <a:r>
               <a:rPr lang="en-US" sz="2400" dirty="0"/>
-              <a:t> – public archive of gene reports</a:t>
-            </a:r>
-            <a:endParaRPr lang="en-US" sz="2400" b="1" dirty="0"/>
-          </a:p>
-          <a:p>
-            <a:pPr marL="285750" indent="-285750">
+              <a:t> – public archive of genetic data</a:t>
+            </a:r>
+          </a:p>
+          <a:p>
+            <a:pPr marL="742950" lvl="1" indent="-285750">
               <a:buFont typeface="Arial" panose="020B0604020202020204" pitchFamily="34" charset="0"/>
               <a:buChar char="•"/>
             </a:pPr>
@@ -7792,7 +8198,7 @@
             </a:pPr>
             <a:r>
               <a:rPr lang="en-US" sz="2400" dirty="0"/>
-              <a:t>Categorical: Name of the gene, variant type, impact of the variant</a:t>
+              <a:t>Categorical: Name of the gene, variant type, ‘impact’ of the variant</a:t>
             </a:r>
           </a:p>
           <a:p>
@@ -8124,7 +8530,7 @@
             </a:pPr>
             <a:r>
               <a:rPr lang="en-US" sz="2800" dirty="0"/>
-              <a:t>Ultimately chose the </a:t>
+              <a:t>Ultimately chose </a:t>
             </a:r>
             <a:r>
               <a:rPr lang="en-US" sz="2800" dirty="0" err="1">
@@ -8247,7 +8653,7 @@
         <p:spPr>
           <a:xfrm>
             <a:off x="558800" y="1905000"/>
-            <a:ext cx="5207000" cy="3539430"/>
+            <a:ext cx="5207000" cy="3108543"/>
           </a:xfrm>
           <a:prstGeom prst="rect">
             <a:avLst/>
@@ -8266,7 +8672,7 @@
             </a:pPr>
             <a:r>
               <a:rPr lang="en-US" sz="2800" dirty="0"/>
-              <a:t>Optimized on recall without entirely sacrificing precision</a:t>
+              <a:t>Optimized on recall</a:t>
             </a:r>
           </a:p>
           <a:p>
@@ -8741,8 +9147,8 @@
         </p:nvSpPr>
         <p:spPr>
           <a:xfrm>
-            <a:off x="5442581" y="6149431"/>
-            <a:ext cx="6634445" cy="584775"/>
+            <a:off x="5235307" y="5908607"/>
+            <a:ext cx="6939919" cy="923330"/>
           </a:xfrm>
           <a:prstGeom prst="rect">
             <a:avLst/>
@@ -8750,20 +9156,32 @@
           <a:noFill/>
         </p:spPr>
         <p:txBody>
-          <a:bodyPr wrap="none" rtlCol="0">
+          <a:bodyPr wrap="square" rtlCol="0">
             <a:spAutoFit/>
           </a:bodyPr>
           <a:lstStyle/>
           <a:p>
-            <a:r>
-              <a:rPr lang="en-US" sz="3200" dirty="0">
+            <a:pPr algn="ctr"/>
+            <a:r>
+              <a:rPr lang="en-US" dirty="0">
                 <a:solidFill>
                   <a:srgbClr val="EC435D"/>
                 </a:solidFill>
               </a:rPr>
-              <a:t>Most important feature: CADD_PHRED</a:t>
-            </a:r>
-            <a:endParaRPr lang="en-US" sz="3200" dirty="0">
+              <a:t>Variants which are more common or more damaging have been studied more and are more likely to be classified in a non-conflicting manner</a:t>
+            </a:r>
+          </a:p>
+          <a:p>
+            <a:pPr algn="ctr"/>
+            <a:r>
+              <a:rPr lang="en-US" dirty="0">
+                <a:solidFill>
+                  <a:srgbClr val="EC435D"/>
+                </a:solidFill>
+              </a:rPr>
+              <a:t>(and vice versa)</a:t>
+            </a:r>
+            <a:endParaRPr lang="en-US" dirty="0">
               <a:solidFill>
                 <a:srgbClr val="377A9B"/>
               </a:solidFill>
@@ -8886,83 +9304,6 @@
                 </a:solidFill>
               </a:rPr>
               <a:t>allele frequency</a:t>
-            </a:r>
-          </a:p>
-        </p:txBody>
-      </p:sp>
-      <p:cxnSp>
-        <p:nvCxnSpPr>
-          <p:cNvPr id="19" name="Straight Arrow Connector 18">
-            <a:extLst>
-              <a:ext uri="{FF2B5EF4-FFF2-40B4-BE49-F238E27FC236}">
-                <a16:creationId xmlns:a16="http://schemas.microsoft.com/office/drawing/2014/main" id="{9734D64F-532F-8C4D-B3A0-96CF472E3AD9}"/>
-              </a:ext>
-            </a:extLst>
-          </p:cNvPr>
-          <p:cNvCxnSpPr/>
-          <p:nvPr/>
-        </p:nvCxnSpPr>
-        <p:spPr>
-          <a:xfrm flipH="1">
-            <a:off x="7687478" y="5080000"/>
-            <a:ext cx="715962" cy="0"/>
-          </a:xfrm>
-          <a:prstGeom prst="straightConnector1">
-            <a:avLst/>
-          </a:prstGeom>
-          <a:ln w="28575">
-            <a:solidFill>
-              <a:srgbClr val="EC435D"/>
-            </a:solidFill>
-            <a:tailEnd type="triangle"/>
-          </a:ln>
-        </p:spPr>
-        <p:style>
-          <a:lnRef idx="1">
-            <a:schemeClr val="accent1"/>
-          </a:lnRef>
-          <a:fillRef idx="0">
-            <a:schemeClr val="accent1"/>
-          </a:fillRef>
-          <a:effectRef idx="0">
-            <a:schemeClr val="accent1"/>
-          </a:effectRef>
-          <a:fontRef idx="minor">
-            <a:schemeClr val="tx1"/>
-          </a:fontRef>
-        </p:style>
-      </p:cxnSp>
-      <p:sp>
-        <p:nvSpPr>
-          <p:cNvPr id="20" name="TextBox 19">
-            <a:extLst>
-              <a:ext uri="{FF2B5EF4-FFF2-40B4-BE49-F238E27FC236}">
-                <a16:creationId xmlns:a16="http://schemas.microsoft.com/office/drawing/2014/main" id="{48D19391-903A-5040-8FF8-DCCE540D5E58}"/>
-              </a:ext>
-            </a:extLst>
-          </p:cNvPr>
-          <p:cNvSpPr txBox="1"/>
-          <p:nvPr/>
-        </p:nvSpPr>
-        <p:spPr>
-          <a:xfrm>
-            <a:off x="8403440" y="4664501"/>
-            <a:ext cx="2488090" cy="830997"/>
-          </a:xfrm>
-          <a:prstGeom prst="rect">
-            <a:avLst/>
-          </a:prstGeom>
-          <a:noFill/>
-        </p:spPr>
-        <p:txBody>
-          <a:bodyPr wrap="square" rtlCol="0">
-            <a:spAutoFit/>
-          </a:bodyPr>
-          <a:lstStyle/>
-          <a:p>
-            <a:r>
-              <a:rPr lang="en-US" sz="1600" dirty="0"/>
-              <a:t>Some specific genes more likely to be classified in a conflicting manner or not</a:t>
             </a:r>
           </a:p>
         </p:txBody>

</xml_diff>